<commit_message>
Zusammenfassung und Ausblick geschrieben
</commit_message>
<xml_diff>
--- a/Dokumente/Präsentationen/2019-04-29_DA_Feldkemper_Probeverteidigung.pptx
+++ b/Dokumente/Präsentationen/2019-04-29_DA_Feldkemper_Probeverteidigung.pptx
@@ -49,14 +49,14 @@
   <p:notesSz cx="6858000" cy="9144000"/>
   <p:embeddedFontLst>
     <p:embeddedFont>
-      <p:font typeface="Calibri" panose="020F0502020204030204" pitchFamily="34" charset="0"/>
+      <p:font typeface="Open Sans" panose="020B0604020202020204" charset="0"/>
       <p:regular r:id="rId37"/>
       <p:bold r:id="rId38"/>
       <p:italic r:id="rId39"/>
       <p:boldItalic r:id="rId40"/>
     </p:embeddedFont>
     <p:embeddedFont>
-      <p:font typeface="Open Sans" panose="020B0606030504020204" pitchFamily="34" charset="0"/>
+      <p:font typeface="Calibri" panose="020F0502020204030204" pitchFamily="34" charset="0"/>
       <p:regular r:id="rId41"/>
       <p:bold r:id="rId42"/>
       <p:italic r:id="rId43"/>
@@ -333,7 +333,7 @@
           <a:p>
             <a:fld id="{C6AC6211-610F-44E5-BF19-D3CDF6EDD281}" type="datetimeFigureOut">
               <a:rPr lang="de-DE" smtClean="0"/>
-              <a:t>14.04.19</a:t>
+              <a:t>15.04.2019</a:t>
             </a:fld>
             <a:endParaRPr lang="de-DE"/>
           </a:p>
@@ -1139,7 +1139,7 @@
           <a:p>
             <a:fld id="{347435D3-23A6-45D3-8DFA-7317DC1E7A64}" type="datetimeFigureOut">
               <a:rPr lang="de-DE" smtClean="0"/>
-              <a:t>14.04.19</a:t>
+              <a:t>15.04.2019</a:t>
             </a:fld>
             <a:endParaRPr lang="de-DE"/>
           </a:p>
@@ -2422,7 +2422,7 @@
           <p:cNvPr id="15" name="Rechteck 14">
             <a:extLst>
               <a:ext uri="{FF2B5EF4-FFF2-40B4-BE49-F238E27FC236}">
-                <a16:creationId xmlns:a16="http://schemas.microsoft.com/office/drawing/2014/main" id="{F770C3AA-244C-A141-BC22-D074823F4293}"/>
+                <a16:creationId xmlns="" xmlns:a16="http://schemas.microsoft.com/office/drawing/2014/main" id="{F770C3AA-244C-A141-BC22-D074823F4293}"/>
               </a:ext>
             </a:extLst>
           </p:cNvPr>
@@ -2662,7 +2662,7 @@
           <p:cNvPr id="5" name="Grafik 4">
             <a:extLst>
               <a:ext uri="{FF2B5EF4-FFF2-40B4-BE49-F238E27FC236}">
-                <a16:creationId xmlns:a16="http://schemas.microsoft.com/office/drawing/2014/main" id="{C0F785FA-BB6E-6347-A8C6-9846216D4CBB}"/>
+                <a16:creationId xmlns="" xmlns:a16="http://schemas.microsoft.com/office/drawing/2014/main" id="{C0F785FA-BB6E-6347-A8C6-9846216D4CBB}"/>
               </a:ext>
             </a:extLst>
           </p:cNvPr>
@@ -2851,7 +2851,7 @@
           <p:cNvPr id="12" name="Grafik 11" hidden="1">
             <a:extLst>
               <a:ext uri="{FF2B5EF4-FFF2-40B4-BE49-F238E27FC236}">
-                <a16:creationId xmlns:a16="http://schemas.microsoft.com/office/drawing/2014/main" id="{CFC0D4A5-64CF-6D49-98B1-9FF6119E60EC}"/>
+                <a16:creationId xmlns="" xmlns:a16="http://schemas.microsoft.com/office/drawing/2014/main" id="{CFC0D4A5-64CF-6D49-98B1-9FF6119E60EC}"/>
               </a:ext>
             </a:extLst>
           </p:cNvPr>
@@ -2881,7 +2881,7 @@
           <p:cNvPr id="17" name="Grafik 16">
             <a:extLst>
               <a:ext uri="{FF2B5EF4-FFF2-40B4-BE49-F238E27FC236}">
-                <a16:creationId xmlns:a16="http://schemas.microsoft.com/office/drawing/2014/main" id="{22ECE872-F4EF-2A49-BA96-6065BC99D769}"/>
+                <a16:creationId xmlns="" xmlns:a16="http://schemas.microsoft.com/office/drawing/2014/main" id="{22ECE872-F4EF-2A49-BA96-6065BC99D769}"/>
               </a:ext>
             </a:extLst>
           </p:cNvPr>
@@ -3151,7 +3151,7 @@
           <p:cNvPr id="5" name="Rechteck 4">
             <a:extLst>
               <a:ext uri="{FF2B5EF4-FFF2-40B4-BE49-F238E27FC236}">
-                <a16:creationId xmlns:a16="http://schemas.microsoft.com/office/drawing/2014/main" id="{FD770378-5F2D-DE46-8D66-09007E946AD3}"/>
+                <a16:creationId xmlns="" xmlns:a16="http://schemas.microsoft.com/office/drawing/2014/main" id="{FD770378-5F2D-DE46-8D66-09007E946AD3}"/>
               </a:ext>
             </a:extLst>
           </p:cNvPr>
@@ -3215,7 +3215,7 @@
           <p:cNvPr id="4" name="Grafik 3">
             <a:extLst>
               <a:ext uri="{FF2B5EF4-FFF2-40B4-BE49-F238E27FC236}">
-                <a16:creationId xmlns:a16="http://schemas.microsoft.com/office/drawing/2014/main" id="{4FE30B28-5777-FC40-9C3F-81738D289A6A}"/>
+                <a16:creationId xmlns="" xmlns:a16="http://schemas.microsoft.com/office/drawing/2014/main" id="{4FE30B28-5777-FC40-9C3F-81738D289A6A}"/>
               </a:ext>
             </a:extLst>
           </p:cNvPr>
@@ -3286,7 +3286,7 @@
           <p:cNvPr id="6" name="Textplatzhalter 25">
             <a:extLst>
               <a:ext uri="{FF2B5EF4-FFF2-40B4-BE49-F238E27FC236}">
-                <a16:creationId xmlns:a16="http://schemas.microsoft.com/office/drawing/2014/main" id="{A625CB76-33FD-F742-81DB-F571E1D3988E}"/>
+                <a16:creationId xmlns="" xmlns:a16="http://schemas.microsoft.com/office/drawing/2014/main" id="{A625CB76-33FD-F742-81DB-F571E1D3988E}"/>
               </a:ext>
             </a:extLst>
           </p:cNvPr>
@@ -3357,7 +3357,7 @@
           <p:cNvPr id="9" name="Grafik 8">
             <a:extLst>
               <a:ext uri="{FF2B5EF4-FFF2-40B4-BE49-F238E27FC236}">
-                <a16:creationId xmlns:a16="http://schemas.microsoft.com/office/drawing/2014/main" id="{8BFAE0AD-6B6F-7D46-B734-E35EC976BB2F}"/>
+                <a16:creationId xmlns="" xmlns:a16="http://schemas.microsoft.com/office/drawing/2014/main" id="{8BFAE0AD-6B6F-7D46-B734-E35EC976BB2F}"/>
               </a:ext>
             </a:extLst>
           </p:cNvPr>
@@ -3423,7 +3423,7 @@
           <p:cNvPr id="24" name="Bildplatzhalter 23">
             <a:extLst>
               <a:ext uri="{FF2B5EF4-FFF2-40B4-BE49-F238E27FC236}">
-                <a16:creationId xmlns:a16="http://schemas.microsoft.com/office/drawing/2014/main" id="{24A56C48-CA8D-D349-89CC-35C3A65DC4D5}"/>
+                <a16:creationId xmlns="" xmlns:a16="http://schemas.microsoft.com/office/drawing/2014/main" id="{24A56C48-CA8D-D349-89CC-35C3A65DC4D5}"/>
               </a:ext>
             </a:extLst>
           </p:cNvPr>
@@ -3737,7 +3737,7 @@
           <p:cNvPr id="6" name="Textplatzhalter 5">
             <a:extLst>
               <a:ext uri="{FF2B5EF4-FFF2-40B4-BE49-F238E27FC236}">
-                <a16:creationId xmlns:a16="http://schemas.microsoft.com/office/drawing/2014/main" id="{2E77FCEF-52F5-324B-A583-005ABCE0E622}"/>
+                <a16:creationId xmlns="" xmlns:a16="http://schemas.microsoft.com/office/drawing/2014/main" id="{2E77FCEF-52F5-324B-A583-005ABCE0E622}"/>
               </a:ext>
             </a:extLst>
           </p:cNvPr>
@@ -3775,7 +3775,7 @@
           <p:cNvPr id="13" name="Grafik 12">
             <a:extLst>
               <a:ext uri="{FF2B5EF4-FFF2-40B4-BE49-F238E27FC236}">
-                <a16:creationId xmlns:a16="http://schemas.microsoft.com/office/drawing/2014/main" id="{F84F96E3-FAED-E24A-9E01-BBA4824F0E34}"/>
+                <a16:creationId xmlns="" xmlns:a16="http://schemas.microsoft.com/office/drawing/2014/main" id="{F84F96E3-FAED-E24A-9E01-BBA4824F0E34}"/>
               </a:ext>
             </a:extLst>
           </p:cNvPr>
@@ -3946,7 +3946,7 @@
           <p:cNvPr id="6" name="Rechteck 5">
             <a:extLst>
               <a:ext uri="{FF2B5EF4-FFF2-40B4-BE49-F238E27FC236}">
-                <a16:creationId xmlns:a16="http://schemas.microsoft.com/office/drawing/2014/main" id="{2447D286-D9F9-E84F-9173-2C8D2D2068E1}"/>
+                <a16:creationId xmlns="" xmlns:a16="http://schemas.microsoft.com/office/drawing/2014/main" id="{2447D286-D9F9-E84F-9173-2C8D2D2068E1}"/>
               </a:ext>
             </a:extLst>
           </p:cNvPr>
@@ -4013,7 +4013,7 @@
           <p:cNvPr id="10" name="Grafik 9">
             <a:extLst>
               <a:ext uri="{FF2B5EF4-FFF2-40B4-BE49-F238E27FC236}">
-                <a16:creationId xmlns:a16="http://schemas.microsoft.com/office/drawing/2014/main" id="{E4DBCC79-CA26-C240-B119-9127A62CDBA8}"/>
+                <a16:creationId xmlns="" xmlns:a16="http://schemas.microsoft.com/office/drawing/2014/main" id="{E4DBCC79-CA26-C240-B119-9127A62CDBA8}"/>
               </a:ext>
             </a:extLst>
           </p:cNvPr>
@@ -4115,7 +4115,7 @@
           <p:cNvPr id="5" name="Rechteck 4">
             <a:extLst>
               <a:ext uri="{FF2B5EF4-FFF2-40B4-BE49-F238E27FC236}">
-                <a16:creationId xmlns:a16="http://schemas.microsoft.com/office/drawing/2014/main" id="{FD770378-5F2D-DE46-8D66-09007E946AD3}"/>
+                <a16:creationId xmlns="" xmlns:a16="http://schemas.microsoft.com/office/drawing/2014/main" id="{FD770378-5F2D-DE46-8D66-09007E946AD3}"/>
               </a:ext>
             </a:extLst>
           </p:cNvPr>
@@ -4179,7 +4179,7 @@
           <p:cNvPr id="4" name="Grafik 3">
             <a:extLst>
               <a:ext uri="{FF2B5EF4-FFF2-40B4-BE49-F238E27FC236}">
-                <a16:creationId xmlns:a16="http://schemas.microsoft.com/office/drawing/2014/main" id="{4FE30B28-5777-FC40-9C3F-81738D289A6A}"/>
+                <a16:creationId xmlns="" xmlns:a16="http://schemas.microsoft.com/office/drawing/2014/main" id="{4FE30B28-5777-FC40-9C3F-81738D289A6A}"/>
               </a:ext>
             </a:extLst>
           </p:cNvPr>
@@ -5128,6 +5128,17 @@
               <a:tabLst/>
               <a:defRPr/>
             </a:pPr>
+            <a:r>
+              <a:rPr lang="de-DE" sz="800" dirty="0">
+                <a:solidFill>
+                  <a:schemeClr val="bg2"/>
+                </a:solidFill>
+                <a:latin typeface="Open Sans" panose="020B0606030504020204" pitchFamily="34" charset="0"/>
+                <a:ea typeface="Open Sans" panose="020B0606030504020204" pitchFamily="34" charset="0"/>
+                <a:cs typeface="Open Sans" panose="020B0606030504020204" pitchFamily="34" charset="0"/>
+              </a:rPr>
+              <a:t/>
+            </a:r>
             <a:br>
               <a:rPr lang="de-DE" sz="800" dirty="0">
                 <a:solidFill>
@@ -5291,7 +5302,7 @@
           <p:cNvPr id="13" name="Grafik 12">
             <a:extLst>
               <a:ext uri="{FF2B5EF4-FFF2-40B4-BE49-F238E27FC236}">
-                <a16:creationId xmlns:a16="http://schemas.microsoft.com/office/drawing/2014/main" id="{2DC3CACD-C7C8-274E-BCD4-043370996A48}"/>
+                <a16:creationId xmlns="" xmlns:a16="http://schemas.microsoft.com/office/drawing/2014/main" id="{2DC3CACD-C7C8-274E-BCD4-043370996A48}"/>
               </a:ext>
             </a:extLst>
           </p:cNvPr>
@@ -7622,7 +7633,7 @@
           <p:cNvPr id="4" name="Inhaltsplatzhalter 3">
             <a:extLst>
               <a:ext uri="{FF2B5EF4-FFF2-40B4-BE49-F238E27FC236}">
-                <a16:creationId xmlns:a16="http://schemas.microsoft.com/office/drawing/2014/main" id="{D8B53BA4-2ACD-A744-A448-732561547552}"/>
+                <a16:creationId xmlns="" xmlns:a16="http://schemas.microsoft.com/office/drawing/2014/main" id="{D8B53BA4-2ACD-A744-A448-732561547552}"/>
               </a:ext>
             </a:extLst>
           </p:cNvPr>
@@ -7652,28 +7663,28 @@
                 <a:gridCol w="3369909">
                   <a:extLst>
                     <a:ext uri="{9D8B030D-6E8A-4147-A177-3AD203B41FA5}">
-                      <a16:colId xmlns:a16="http://schemas.microsoft.com/office/drawing/2014/main" val="141174548"/>
+                      <a16:colId xmlns="" xmlns:a16="http://schemas.microsoft.com/office/drawing/2014/main" val="141174548"/>
                     </a:ext>
                   </a:extLst>
                 </a:gridCol>
                 <a:gridCol w="1456267">
                   <a:extLst>
                     <a:ext uri="{9D8B030D-6E8A-4147-A177-3AD203B41FA5}">
-                      <a16:colId xmlns:a16="http://schemas.microsoft.com/office/drawing/2014/main" val="2742050981"/>
+                      <a16:colId xmlns="" xmlns:a16="http://schemas.microsoft.com/office/drawing/2014/main" val="2742050981"/>
                     </a:ext>
                   </a:extLst>
                 </a:gridCol>
                 <a:gridCol w="2844800">
                   <a:extLst>
                     <a:ext uri="{9D8B030D-6E8A-4147-A177-3AD203B41FA5}">
-                      <a16:colId xmlns:a16="http://schemas.microsoft.com/office/drawing/2014/main" val="1971836177"/>
+                      <a16:colId xmlns="" xmlns:a16="http://schemas.microsoft.com/office/drawing/2014/main" val="1971836177"/>
                     </a:ext>
                   </a:extLst>
                 </a:gridCol>
                 <a:gridCol w="2909713">
                   <a:extLst>
                     <a:ext uri="{9D8B030D-6E8A-4147-A177-3AD203B41FA5}">
-                      <a16:colId xmlns:a16="http://schemas.microsoft.com/office/drawing/2014/main" val="3907636905"/>
+                      <a16:colId xmlns="" xmlns:a16="http://schemas.microsoft.com/office/drawing/2014/main" val="3907636905"/>
                     </a:ext>
                   </a:extLst>
                 </a:gridCol>
@@ -7861,7 +7872,7 @@
                 </a:tc>
                 <a:extLst>
                   <a:ext uri="{0D108BD9-81ED-4DB2-BD59-A6C34878D82A}">
-                    <a16:rowId xmlns:a16="http://schemas.microsoft.com/office/drawing/2014/main" val="809439035"/>
+                    <a16:rowId xmlns="" xmlns:a16="http://schemas.microsoft.com/office/drawing/2014/main" val="809439035"/>
                   </a:ext>
                 </a:extLst>
               </a:tr>
@@ -8080,7 +8091,7 @@
                 </a:tc>
                 <a:extLst>
                   <a:ext uri="{0D108BD9-81ED-4DB2-BD59-A6C34878D82A}">
-                    <a16:rowId xmlns:a16="http://schemas.microsoft.com/office/drawing/2014/main" val="2200667029"/>
+                    <a16:rowId xmlns="" xmlns:a16="http://schemas.microsoft.com/office/drawing/2014/main" val="2200667029"/>
                   </a:ext>
                 </a:extLst>
               </a:tr>
@@ -8296,7 +8307,7 @@
                 </a:tc>
                 <a:extLst>
                   <a:ext uri="{0D108BD9-81ED-4DB2-BD59-A6C34878D82A}">
-                    <a16:rowId xmlns:a16="http://schemas.microsoft.com/office/drawing/2014/main" val="1380470865"/>
+                    <a16:rowId xmlns="" xmlns:a16="http://schemas.microsoft.com/office/drawing/2014/main" val="1380470865"/>
                   </a:ext>
                 </a:extLst>
               </a:tr>
@@ -8309,6 +8320,10 @@
                       <a:r>
                         <a:rPr lang="de-DE" dirty="0" err="1"/>
                         <a:t>Klustern</a:t>
+                      </a:r>
+                      <a:r>
+                        <a:rPr lang="de-DE" dirty="0"/>
+                        <a:t/>
                       </a:r>
                       <a:br>
                         <a:rPr lang="de-DE" dirty="0"/>
@@ -8478,7 +8493,7 @@
                 </a:tc>
                 <a:extLst>
                   <a:ext uri="{0D108BD9-81ED-4DB2-BD59-A6C34878D82A}">
-                    <a16:rowId xmlns:a16="http://schemas.microsoft.com/office/drawing/2014/main" val="1639158171"/>
+                    <a16:rowId xmlns="" xmlns:a16="http://schemas.microsoft.com/office/drawing/2014/main" val="1639158171"/>
                   </a:ext>
                 </a:extLst>
               </a:tr>
@@ -8554,7 +8569,7 @@
           <p:cNvPr id="6" name="Inhaltsplatzhalter 3">
             <a:extLst>
               <a:ext uri="{FF2B5EF4-FFF2-40B4-BE49-F238E27FC236}">
-                <a16:creationId xmlns:a16="http://schemas.microsoft.com/office/drawing/2014/main" id="{DBADCED9-543C-1E47-8AF6-1E397EC8D59C}"/>
+                <a16:creationId xmlns="" xmlns:a16="http://schemas.microsoft.com/office/drawing/2014/main" id="{DBADCED9-543C-1E47-8AF6-1E397EC8D59C}"/>
               </a:ext>
             </a:extLst>
           </p:cNvPr>
@@ -8593,7 +8608,7 @@
           <p:cNvPr id="7" name="Grafik 6">
             <a:extLst>
               <a:ext uri="{FF2B5EF4-FFF2-40B4-BE49-F238E27FC236}">
-                <a16:creationId xmlns:a16="http://schemas.microsoft.com/office/drawing/2014/main" id="{52E4E9CF-A817-5046-9043-99978E26ECAA}"/>
+                <a16:creationId xmlns="" xmlns:a16="http://schemas.microsoft.com/office/drawing/2014/main" id="{52E4E9CF-A817-5046-9043-99978E26ECAA}"/>
               </a:ext>
             </a:extLst>
           </p:cNvPr>
@@ -8729,7 +8744,7 @@
           <p:cNvPr id="2" name="Titel 1">
             <a:extLst>
               <a:ext uri="{FF2B5EF4-FFF2-40B4-BE49-F238E27FC236}">
-                <a16:creationId xmlns:a16="http://schemas.microsoft.com/office/drawing/2014/main" id="{B1F459B3-5CC9-8141-8CBB-3D63C0BD6799}"/>
+                <a16:creationId xmlns="" xmlns:a16="http://schemas.microsoft.com/office/drawing/2014/main" id="{B1F459B3-5CC9-8141-8CBB-3D63C0BD6799}"/>
               </a:ext>
             </a:extLst>
           </p:cNvPr>
@@ -8900,7 +8915,7 @@
           <p:cNvPr id="8" name="Oval 52">
             <a:extLst>
               <a:ext uri="{FF2B5EF4-FFF2-40B4-BE49-F238E27FC236}">
-                <a16:creationId xmlns:a16="http://schemas.microsoft.com/office/drawing/2014/main" id="{A7F525C7-2BB3-7741-BE0A-A91605F6B414}"/>
+                <a16:creationId xmlns="" xmlns:a16="http://schemas.microsoft.com/office/drawing/2014/main" id="{A7F525C7-2BB3-7741-BE0A-A91605F6B414}"/>
               </a:ext>
             </a:extLst>
           </p:cNvPr>
@@ -8952,7 +8967,7 @@
           <p:cNvPr id="9" name="Oval 53">
             <a:extLst>
               <a:ext uri="{FF2B5EF4-FFF2-40B4-BE49-F238E27FC236}">
-                <a16:creationId xmlns:a16="http://schemas.microsoft.com/office/drawing/2014/main" id="{7A84F289-E89F-8342-8791-347A0E4F5BF9}"/>
+                <a16:creationId xmlns="" xmlns:a16="http://schemas.microsoft.com/office/drawing/2014/main" id="{7A84F289-E89F-8342-8791-347A0E4F5BF9}"/>
               </a:ext>
             </a:extLst>
           </p:cNvPr>
@@ -9004,7 +9019,7 @@
           <p:cNvPr id="10" name="Oval 54">
             <a:extLst>
               <a:ext uri="{FF2B5EF4-FFF2-40B4-BE49-F238E27FC236}">
-                <a16:creationId xmlns:a16="http://schemas.microsoft.com/office/drawing/2014/main" id="{A65E12B4-4201-2148-B5CA-CF3C353E009F}"/>
+                <a16:creationId xmlns="" xmlns:a16="http://schemas.microsoft.com/office/drawing/2014/main" id="{A65E12B4-4201-2148-B5CA-CF3C353E009F}"/>
               </a:ext>
             </a:extLst>
           </p:cNvPr>
@@ -9058,7 +9073,7 @@
               <p14:cNvPr id="11" name="Freihand 10">
                 <a:extLst>
                   <a:ext uri="{FF2B5EF4-FFF2-40B4-BE49-F238E27FC236}">
-                    <a16:creationId xmlns:a16="http://schemas.microsoft.com/office/drawing/2014/main" id="{5B3C06F8-598F-844F-A3A1-C175A796CC1F}"/>
+                    <a16:creationId xmlns="" xmlns:a16="http://schemas.microsoft.com/office/drawing/2014/main" id="{5B3C06F8-598F-844F-A3A1-C175A796CC1F}"/>
                   </a:ext>
                 </a:extLst>
               </p14:cNvPr>
@@ -9109,7 +9124,7 @@
               <p14:cNvPr id="12" name="Freihand 11">
                 <a:extLst>
                   <a:ext uri="{FF2B5EF4-FFF2-40B4-BE49-F238E27FC236}">
-                    <a16:creationId xmlns:a16="http://schemas.microsoft.com/office/drawing/2014/main" id="{082C1878-4FC7-A046-A15C-155DA5A4994F}"/>
+                    <a16:creationId xmlns="" xmlns:a16="http://schemas.microsoft.com/office/drawing/2014/main" id="{082C1878-4FC7-A046-A15C-155DA5A4994F}"/>
                   </a:ext>
                 </a:extLst>
               </p14:cNvPr>
@@ -9160,7 +9175,7 @@
               <p14:cNvPr id="13" name="Freihand 12">
                 <a:extLst>
                   <a:ext uri="{FF2B5EF4-FFF2-40B4-BE49-F238E27FC236}">
-                    <a16:creationId xmlns:a16="http://schemas.microsoft.com/office/drawing/2014/main" id="{4493D0F5-C439-AB47-A7AB-C5899EB6F429}"/>
+                    <a16:creationId xmlns="" xmlns:a16="http://schemas.microsoft.com/office/drawing/2014/main" id="{4493D0F5-C439-AB47-A7AB-C5899EB6F429}"/>
                   </a:ext>
                 </a:extLst>
               </p14:cNvPr>
@@ -9204,14 +9219,14 @@
           </p:pic>
         </mc:Fallback>
       </mc:AlternateContent>
-      <mc:AlternateContent xmlns:mc="http://schemas.openxmlformats.org/markup-compatibility/2006">
-        <mc:Choice xmlns:p14="http://schemas.microsoft.com/office/powerpoint/2010/main" Requires="p14">
+      <mc:AlternateContent xmlns:mc="http://schemas.openxmlformats.org/markup-compatibility/2006" xmlns:p14="http://schemas.microsoft.com/office/powerpoint/2010/main">
+        <mc:Choice Requires="p14">
           <p:contentPart p14:bwMode="auto" r:id="rId11">
             <p14:nvContentPartPr>
               <p14:cNvPr id="18" name="Freihand 17">
                 <a:extLst>
                   <a:ext uri="{FF2B5EF4-FFF2-40B4-BE49-F238E27FC236}">
-                    <a16:creationId xmlns:a16="http://schemas.microsoft.com/office/drawing/2014/main" id="{1E33159F-5EDA-7243-9035-848447A03A46}"/>
+                    <a16:creationId xmlns="" xmlns:a16="http://schemas.microsoft.com/office/drawing/2014/main" id="{1E33159F-5EDA-7243-9035-848447A03A46}"/>
                   </a:ext>
                 </a:extLst>
               </p14:cNvPr>
@@ -9224,7 +9239,7 @@
             </p14:xfrm>
           </p:contentPart>
         </mc:Choice>
-        <mc:Fallback>
+        <mc:Fallback xmlns="">
           <p:pic>
             <p:nvPicPr>
               <p:cNvPr id="18" name="Freihand 17">
@@ -9260,7 +9275,7 @@
           <p:cNvPr id="19" name="Grafik 18">
             <a:extLst>
               <a:ext uri="{FF2B5EF4-FFF2-40B4-BE49-F238E27FC236}">
-                <a16:creationId xmlns:a16="http://schemas.microsoft.com/office/drawing/2014/main" id="{3E5CCF41-B5EC-8545-8430-A78ACA0F9371}"/>
+                <a16:creationId xmlns="" xmlns:a16="http://schemas.microsoft.com/office/drawing/2014/main" id="{3E5CCF41-B5EC-8545-8430-A78ACA0F9371}"/>
               </a:ext>
             </a:extLst>
           </p:cNvPr>
@@ -9290,7 +9305,7 @@
           <p:cNvPr id="29" name="Gruppieren 28">
             <a:extLst>
               <a:ext uri="{FF2B5EF4-FFF2-40B4-BE49-F238E27FC236}">
-                <a16:creationId xmlns:a16="http://schemas.microsoft.com/office/drawing/2014/main" id="{FAE6EC32-92E8-704F-83BA-F308FB46A402}"/>
+                <a16:creationId xmlns="" xmlns:a16="http://schemas.microsoft.com/office/drawing/2014/main" id="{FAE6EC32-92E8-704F-83BA-F308FB46A402}"/>
               </a:ext>
             </a:extLst>
           </p:cNvPr>
@@ -9310,7 +9325,7 @@
             <p:cNvPr id="30" name="Rechteck 29">
               <a:extLst>
                 <a:ext uri="{FF2B5EF4-FFF2-40B4-BE49-F238E27FC236}">
-                  <a16:creationId xmlns:a16="http://schemas.microsoft.com/office/drawing/2014/main" id="{2D082488-1F16-6243-8438-DB6727A3BC50}"/>
+                  <a16:creationId xmlns="" xmlns:a16="http://schemas.microsoft.com/office/drawing/2014/main" id="{2D082488-1F16-6243-8438-DB6727A3BC50}"/>
                 </a:ext>
               </a:extLst>
             </p:cNvPr>
@@ -9367,8 +9382,38 @@
                     <a:schemeClr val="tx1"/>
                   </a:solidFill>
                 </a:rPr>
-                <a:t>Nutzer kann Probleme und Lösungen eingeben</a:t>
+                <a:t>Nutzer kann Probleme und Lösungen </a:t>
               </a:r>
+              <a:r>
+                <a:rPr lang="de-DE" dirty="0" smtClean="0">
+                  <a:solidFill>
+                    <a:schemeClr val="tx1"/>
+                  </a:solidFill>
+                </a:rPr>
+                <a:t>eingeben</a:t>
+              </a:r>
+            </a:p>
+            <a:p>
+              <a:pPr marL="342900" indent="-342900">
+                <a:lnSpc>
+                  <a:spcPct val="120000"/>
+                </a:lnSpc>
+                <a:buFont typeface="Arial" panose="020B0604020202020204" pitchFamily="34" charset="0"/>
+                <a:buChar char="•"/>
+              </a:pPr>
+              <a:r>
+                <a:rPr lang="de-DE" dirty="0" smtClean="0">
+                  <a:solidFill>
+                    <a:schemeClr val="tx1"/>
+                  </a:solidFill>
+                </a:rPr>
+                <a:t>Darstellung von Serviceabhängigkeiten</a:t>
+              </a:r>
+              <a:endParaRPr lang="de-DE" dirty="0">
+                <a:solidFill>
+                  <a:schemeClr val="tx1"/>
+                </a:solidFill>
+              </a:endParaRPr>
             </a:p>
           </p:txBody>
         </p:sp>
@@ -9377,7 +9422,7 @@
             <p:cNvPr id="31" name="Rechteck 30">
               <a:extLst>
                 <a:ext uri="{FF2B5EF4-FFF2-40B4-BE49-F238E27FC236}">
-                  <a16:creationId xmlns:a16="http://schemas.microsoft.com/office/drawing/2014/main" id="{456DFC42-7138-5842-B9B8-2933059BB8B0}"/>
+                  <a16:creationId xmlns="" xmlns:a16="http://schemas.microsoft.com/office/drawing/2014/main" id="{456DFC42-7138-5842-B9B8-2933059BB8B0}"/>
                 </a:ext>
               </a:extLst>
             </p:cNvPr>
@@ -9436,7 +9481,7 @@
           <p:cNvPr id="32" name="Gruppieren 31">
             <a:extLst>
               <a:ext uri="{FF2B5EF4-FFF2-40B4-BE49-F238E27FC236}">
-                <a16:creationId xmlns:a16="http://schemas.microsoft.com/office/drawing/2014/main" id="{844F6D30-D5A4-C04A-ADBA-18E25851FDF5}"/>
+                <a16:creationId xmlns="" xmlns:a16="http://schemas.microsoft.com/office/drawing/2014/main" id="{844F6D30-D5A4-C04A-ADBA-18E25851FDF5}"/>
               </a:ext>
             </a:extLst>
           </p:cNvPr>
@@ -9456,7 +9501,7 @@
             <p:cNvPr id="33" name="Rechteck 32">
               <a:extLst>
                 <a:ext uri="{FF2B5EF4-FFF2-40B4-BE49-F238E27FC236}">
-                  <a16:creationId xmlns:a16="http://schemas.microsoft.com/office/drawing/2014/main" id="{8E73C930-D810-B548-B325-2CD71D76ADBB}"/>
+                  <a16:creationId xmlns="" xmlns:a16="http://schemas.microsoft.com/office/drawing/2014/main" id="{8E73C930-D810-B548-B325-2CD71D76ADBB}"/>
                 </a:ext>
               </a:extLst>
             </p:cNvPr>
@@ -9508,13 +9553,18 @@
                 <a:buChar char="•"/>
               </a:pPr>
               <a:r>
-                <a:rPr lang="de-DE" dirty="0">
+                <a:rPr lang="de-DE" dirty="0" smtClean="0">
                   <a:solidFill>
                     <a:schemeClr val="tx1"/>
                   </a:solidFill>
                 </a:rPr>
-                <a:t>Nutzer kann Probleme und Lösungen eingeben</a:t>
+                <a:t>Wie werden die Informationen aus der modularen Anlage verarbeitet?</a:t>
               </a:r>
+              <a:endParaRPr lang="de-DE" dirty="0">
+                <a:solidFill>
+                  <a:schemeClr val="tx1"/>
+                </a:solidFill>
+              </a:endParaRPr>
             </a:p>
           </p:txBody>
         </p:sp>
@@ -9523,7 +9573,7 @@
             <p:cNvPr id="34" name="Rechteck 33">
               <a:extLst>
                 <a:ext uri="{FF2B5EF4-FFF2-40B4-BE49-F238E27FC236}">
-                  <a16:creationId xmlns:a16="http://schemas.microsoft.com/office/drawing/2014/main" id="{9511CF2B-BCCD-B648-81EC-E6CF3F16BCED}"/>
+                  <a16:creationId xmlns="" xmlns:a16="http://schemas.microsoft.com/office/drawing/2014/main" id="{9511CF2B-BCCD-B648-81EC-E6CF3F16BCED}"/>
                 </a:ext>
               </a:extLst>
             </p:cNvPr>
@@ -9582,7 +9632,7 @@
           <p:cNvPr id="35" name="Gruppieren 34">
             <a:extLst>
               <a:ext uri="{FF2B5EF4-FFF2-40B4-BE49-F238E27FC236}">
-                <a16:creationId xmlns:a16="http://schemas.microsoft.com/office/drawing/2014/main" id="{3D302C86-545B-9A4A-AAB4-6374FD9C12A9}"/>
+                <a16:creationId xmlns="" xmlns:a16="http://schemas.microsoft.com/office/drawing/2014/main" id="{3D302C86-545B-9A4A-AAB4-6374FD9C12A9}"/>
               </a:ext>
             </a:extLst>
           </p:cNvPr>
@@ -9602,7 +9652,7 @@
             <p:cNvPr id="36" name="Rechteck 35">
               <a:extLst>
                 <a:ext uri="{FF2B5EF4-FFF2-40B4-BE49-F238E27FC236}">
-                  <a16:creationId xmlns:a16="http://schemas.microsoft.com/office/drawing/2014/main" id="{23115AAF-35F2-6442-8E5B-8BD850E80E32}"/>
+                  <a16:creationId xmlns="" xmlns:a16="http://schemas.microsoft.com/office/drawing/2014/main" id="{23115AAF-35F2-6442-8E5B-8BD850E80E32}"/>
                 </a:ext>
               </a:extLst>
             </p:cNvPr>
@@ -9686,7 +9736,7 @@
             <p:cNvPr id="37" name="Rechteck 36">
               <a:extLst>
                 <a:ext uri="{FF2B5EF4-FFF2-40B4-BE49-F238E27FC236}">
-                  <a16:creationId xmlns:a16="http://schemas.microsoft.com/office/drawing/2014/main" id="{7F151E5E-545A-4F40-87DA-17083B145725}"/>
+                  <a16:creationId xmlns="" xmlns:a16="http://schemas.microsoft.com/office/drawing/2014/main" id="{7F151E5E-545A-4F40-87DA-17083B145725}"/>
                 </a:ext>
               </a:extLst>
             </p:cNvPr>
@@ -9745,7 +9795,7 @@
           <p:cNvPr id="38" name="Gruppieren 37">
             <a:extLst>
               <a:ext uri="{FF2B5EF4-FFF2-40B4-BE49-F238E27FC236}">
-                <a16:creationId xmlns:a16="http://schemas.microsoft.com/office/drawing/2014/main" id="{1CA8B657-F9AF-5243-AF7E-BB8501B06F90}"/>
+                <a16:creationId xmlns="" xmlns:a16="http://schemas.microsoft.com/office/drawing/2014/main" id="{1CA8B657-F9AF-5243-AF7E-BB8501B06F90}"/>
               </a:ext>
             </a:extLst>
           </p:cNvPr>
@@ -9765,7 +9815,7 @@
             <p:cNvPr id="39" name="Rechteck 38">
               <a:extLst>
                 <a:ext uri="{FF2B5EF4-FFF2-40B4-BE49-F238E27FC236}">
-                  <a16:creationId xmlns:a16="http://schemas.microsoft.com/office/drawing/2014/main" id="{02092F8E-6236-034D-B034-00A54F99E62D}"/>
+                  <a16:creationId xmlns="" xmlns:a16="http://schemas.microsoft.com/office/drawing/2014/main" id="{02092F8E-6236-034D-B034-00A54F99E62D}"/>
                 </a:ext>
               </a:extLst>
             </p:cNvPr>
@@ -9849,7 +9899,7 @@
             <p:cNvPr id="40" name="Rechteck 39">
               <a:extLst>
                 <a:ext uri="{FF2B5EF4-FFF2-40B4-BE49-F238E27FC236}">
-                  <a16:creationId xmlns:a16="http://schemas.microsoft.com/office/drawing/2014/main" id="{1B35C96E-3871-C044-9116-F5A9A8C99AFF}"/>
+                  <a16:creationId xmlns="" xmlns:a16="http://schemas.microsoft.com/office/drawing/2014/main" id="{1B35C96E-3871-C044-9116-F5A9A8C99AFF}"/>
                 </a:ext>
               </a:extLst>
             </p:cNvPr>
@@ -9938,7 +9988,7 @@
           <p:cNvPr id="2" name="Titel 1">
             <a:extLst>
               <a:ext uri="{FF2B5EF4-FFF2-40B4-BE49-F238E27FC236}">
-                <a16:creationId xmlns:a16="http://schemas.microsoft.com/office/drawing/2014/main" id="{B1F459B3-5CC9-8141-8CBB-3D63C0BD6799}"/>
+                <a16:creationId xmlns="" xmlns:a16="http://schemas.microsoft.com/office/drawing/2014/main" id="{B1F459B3-5CC9-8141-8CBB-3D63C0BD6799}"/>
               </a:ext>
             </a:extLst>
           </p:cNvPr>
@@ -10109,7 +10159,7 @@
           <p:cNvPr id="8" name="Oval 52">
             <a:extLst>
               <a:ext uri="{FF2B5EF4-FFF2-40B4-BE49-F238E27FC236}">
-                <a16:creationId xmlns:a16="http://schemas.microsoft.com/office/drawing/2014/main" id="{A7F525C7-2BB3-7741-BE0A-A91605F6B414}"/>
+                <a16:creationId xmlns="" xmlns:a16="http://schemas.microsoft.com/office/drawing/2014/main" id="{A7F525C7-2BB3-7741-BE0A-A91605F6B414}"/>
               </a:ext>
             </a:extLst>
           </p:cNvPr>
@@ -10161,7 +10211,7 @@
           <p:cNvPr id="9" name="Oval 53">
             <a:extLst>
               <a:ext uri="{FF2B5EF4-FFF2-40B4-BE49-F238E27FC236}">
-                <a16:creationId xmlns:a16="http://schemas.microsoft.com/office/drawing/2014/main" id="{7A84F289-E89F-8342-8791-347A0E4F5BF9}"/>
+                <a16:creationId xmlns="" xmlns:a16="http://schemas.microsoft.com/office/drawing/2014/main" id="{7A84F289-E89F-8342-8791-347A0E4F5BF9}"/>
               </a:ext>
             </a:extLst>
           </p:cNvPr>
@@ -10213,7 +10263,7 @@
           <p:cNvPr id="10" name="Oval 54">
             <a:extLst>
               <a:ext uri="{FF2B5EF4-FFF2-40B4-BE49-F238E27FC236}">
-                <a16:creationId xmlns:a16="http://schemas.microsoft.com/office/drawing/2014/main" id="{A65E12B4-4201-2148-B5CA-CF3C353E009F}"/>
+                <a16:creationId xmlns="" xmlns:a16="http://schemas.microsoft.com/office/drawing/2014/main" id="{A65E12B4-4201-2148-B5CA-CF3C353E009F}"/>
               </a:ext>
             </a:extLst>
           </p:cNvPr>
@@ -10267,7 +10317,7 @@
               <p14:cNvPr id="11" name="Freihand 10">
                 <a:extLst>
                   <a:ext uri="{FF2B5EF4-FFF2-40B4-BE49-F238E27FC236}">
-                    <a16:creationId xmlns:a16="http://schemas.microsoft.com/office/drawing/2014/main" id="{5B3C06F8-598F-844F-A3A1-C175A796CC1F}"/>
+                    <a16:creationId xmlns="" xmlns:a16="http://schemas.microsoft.com/office/drawing/2014/main" id="{5B3C06F8-598F-844F-A3A1-C175A796CC1F}"/>
                   </a:ext>
                 </a:extLst>
               </p14:cNvPr>
@@ -10318,7 +10368,7 @@
               <p14:cNvPr id="12" name="Freihand 11">
                 <a:extLst>
                   <a:ext uri="{FF2B5EF4-FFF2-40B4-BE49-F238E27FC236}">
-                    <a16:creationId xmlns:a16="http://schemas.microsoft.com/office/drawing/2014/main" id="{082C1878-4FC7-A046-A15C-155DA5A4994F}"/>
+                    <a16:creationId xmlns="" xmlns:a16="http://schemas.microsoft.com/office/drawing/2014/main" id="{082C1878-4FC7-A046-A15C-155DA5A4994F}"/>
                   </a:ext>
                 </a:extLst>
               </p14:cNvPr>
@@ -10369,7 +10419,7 @@
               <p14:cNvPr id="13" name="Freihand 12">
                 <a:extLst>
                   <a:ext uri="{FF2B5EF4-FFF2-40B4-BE49-F238E27FC236}">
-                    <a16:creationId xmlns:a16="http://schemas.microsoft.com/office/drawing/2014/main" id="{4493D0F5-C439-AB47-A7AB-C5899EB6F429}"/>
+                    <a16:creationId xmlns="" xmlns:a16="http://schemas.microsoft.com/office/drawing/2014/main" id="{4493D0F5-C439-AB47-A7AB-C5899EB6F429}"/>
                   </a:ext>
                 </a:extLst>
               </p14:cNvPr>
@@ -10413,14 +10463,14 @@
           </p:pic>
         </mc:Fallback>
       </mc:AlternateContent>
-      <mc:AlternateContent xmlns:mc="http://schemas.openxmlformats.org/markup-compatibility/2006">
-        <mc:Choice xmlns:p14="http://schemas.microsoft.com/office/powerpoint/2010/main" Requires="p14">
+      <mc:AlternateContent xmlns:mc="http://schemas.openxmlformats.org/markup-compatibility/2006" xmlns:p14="http://schemas.microsoft.com/office/powerpoint/2010/main">
+        <mc:Choice Requires="p14">
           <p:contentPart p14:bwMode="auto" r:id="rId11">
             <p14:nvContentPartPr>
               <p14:cNvPr id="18" name="Freihand 17">
                 <a:extLst>
                   <a:ext uri="{FF2B5EF4-FFF2-40B4-BE49-F238E27FC236}">
-                    <a16:creationId xmlns:a16="http://schemas.microsoft.com/office/drawing/2014/main" id="{1E33159F-5EDA-7243-9035-848447A03A46}"/>
+                    <a16:creationId xmlns="" xmlns:a16="http://schemas.microsoft.com/office/drawing/2014/main" id="{1E33159F-5EDA-7243-9035-848447A03A46}"/>
                   </a:ext>
                 </a:extLst>
               </p14:cNvPr>
@@ -10433,7 +10483,7 @@
             </p14:xfrm>
           </p:contentPart>
         </mc:Choice>
-        <mc:Fallback>
+        <mc:Fallback xmlns="">
           <p:pic>
             <p:nvPicPr>
               <p:cNvPr id="18" name="Freihand 17">
@@ -10469,7 +10519,7 @@
           <p:cNvPr id="19" name="Grafik 18">
             <a:extLst>
               <a:ext uri="{FF2B5EF4-FFF2-40B4-BE49-F238E27FC236}">
-                <a16:creationId xmlns:a16="http://schemas.microsoft.com/office/drawing/2014/main" id="{3E5CCF41-B5EC-8545-8430-A78ACA0F9371}"/>
+                <a16:creationId xmlns="" xmlns:a16="http://schemas.microsoft.com/office/drawing/2014/main" id="{3E5CCF41-B5EC-8545-8430-A78ACA0F9371}"/>
               </a:ext>
             </a:extLst>
           </p:cNvPr>
@@ -10499,7 +10549,7 @@
           <p:cNvPr id="20" name="Textfeld 19">
             <a:extLst>
               <a:ext uri="{FF2B5EF4-FFF2-40B4-BE49-F238E27FC236}">
-                <a16:creationId xmlns:a16="http://schemas.microsoft.com/office/drawing/2014/main" id="{207E01F6-7DC7-694F-87AD-C5FED7E6CB33}"/>
+                <a16:creationId xmlns="" xmlns:a16="http://schemas.microsoft.com/office/drawing/2014/main" id="{207E01F6-7DC7-694F-87AD-C5FED7E6CB33}"/>
               </a:ext>
             </a:extLst>
           </p:cNvPr>
@@ -10534,7 +10584,7 @@
           <p:cNvPr id="21" name="Textfeld 20">
             <a:extLst>
               <a:ext uri="{FF2B5EF4-FFF2-40B4-BE49-F238E27FC236}">
-                <a16:creationId xmlns:a16="http://schemas.microsoft.com/office/drawing/2014/main" id="{3BCDA7B3-1367-8D48-AE88-0DE481BE94B4}"/>
+                <a16:creationId xmlns="" xmlns:a16="http://schemas.microsoft.com/office/drawing/2014/main" id="{3BCDA7B3-1367-8D48-AE88-0DE481BE94B4}"/>
               </a:ext>
             </a:extLst>
           </p:cNvPr>
@@ -10569,7 +10619,7 @@
           <p:cNvPr id="22" name="Textfeld 21">
             <a:extLst>
               <a:ext uri="{FF2B5EF4-FFF2-40B4-BE49-F238E27FC236}">
-                <a16:creationId xmlns:a16="http://schemas.microsoft.com/office/drawing/2014/main" id="{77B2452C-D955-B64A-B37E-1D0E55CA08E1}"/>
+                <a16:creationId xmlns="" xmlns:a16="http://schemas.microsoft.com/office/drawing/2014/main" id="{77B2452C-D955-B64A-B37E-1D0E55CA08E1}"/>
               </a:ext>
             </a:extLst>
           </p:cNvPr>
@@ -10605,7 +10655,7 @@
           <p:cNvPr id="23" name="Textfeld 22">
             <a:extLst>
               <a:ext uri="{FF2B5EF4-FFF2-40B4-BE49-F238E27FC236}">
-                <a16:creationId xmlns:a16="http://schemas.microsoft.com/office/drawing/2014/main" id="{496F256A-1537-D44F-810D-53172766888A}"/>
+                <a16:creationId xmlns="" xmlns:a16="http://schemas.microsoft.com/office/drawing/2014/main" id="{496F256A-1537-D44F-810D-53172766888A}"/>
               </a:ext>
             </a:extLst>
           </p:cNvPr>
@@ -10640,7 +10690,7 @@
           <p:cNvPr id="24" name="Textfeld 23">
             <a:extLst>
               <a:ext uri="{FF2B5EF4-FFF2-40B4-BE49-F238E27FC236}">
-                <a16:creationId xmlns:a16="http://schemas.microsoft.com/office/drawing/2014/main" id="{58B17CF3-9991-294E-A48B-A98C899F09AE}"/>
+                <a16:creationId xmlns="" xmlns:a16="http://schemas.microsoft.com/office/drawing/2014/main" id="{58B17CF3-9991-294E-A48B-A98C899F09AE}"/>
               </a:ext>
             </a:extLst>
           </p:cNvPr>
@@ -10675,7 +10725,7 @@
           <p:cNvPr id="25" name="Textfeld 24">
             <a:extLst>
               <a:ext uri="{FF2B5EF4-FFF2-40B4-BE49-F238E27FC236}">
-                <a16:creationId xmlns:a16="http://schemas.microsoft.com/office/drawing/2014/main" id="{543C326B-FC3F-F744-929F-29FA2D2196F2}"/>
+                <a16:creationId xmlns="" xmlns:a16="http://schemas.microsoft.com/office/drawing/2014/main" id="{543C326B-FC3F-F744-929F-29FA2D2196F2}"/>
               </a:ext>
             </a:extLst>
           </p:cNvPr>
@@ -10710,7 +10760,7 @@
           <p:cNvPr id="26" name="Textfeld 25">
             <a:extLst>
               <a:ext uri="{FF2B5EF4-FFF2-40B4-BE49-F238E27FC236}">
-                <a16:creationId xmlns:a16="http://schemas.microsoft.com/office/drawing/2014/main" id="{A2089A33-0C88-AB4A-AE32-7D94307E74E4}"/>
+                <a16:creationId xmlns="" xmlns:a16="http://schemas.microsoft.com/office/drawing/2014/main" id="{A2089A33-0C88-AB4A-AE32-7D94307E74E4}"/>
               </a:ext>
             </a:extLst>
           </p:cNvPr>
@@ -10753,7 +10803,7 @@
           <p:cNvPr id="27" name="Textfeld 26">
             <a:extLst>
               <a:ext uri="{FF2B5EF4-FFF2-40B4-BE49-F238E27FC236}">
-                <a16:creationId xmlns:a16="http://schemas.microsoft.com/office/drawing/2014/main" id="{928409AF-452F-BA4E-8DAE-22557909D87B}"/>
+                <a16:creationId xmlns="" xmlns:a16="http://schemas.microsoft.com/office/drawing/2014/main" id="{928409AF-452F-BA4E-8DAE-22557909D87B}"/>
               </a:ext>
             </a:extLst>
           </p:cNvPr>
@@ -10788,7 +10838,7 @@
           <p:cNvPr id="28" name="Textfeld 27">
             <a:extLst>
               <a:ext uri="{FF2B5EF4-FFF2-40B4-BE49-F238E27FC236}">
-                <a16:creationId xmlns:a16="http://schemas.microsoft.com/office/drawing/2014/main" id="{6DAAABB9-5B29-9540-9B95-C6AE440332B1}"/>
+                <a16:creationId xmlns="" xmlns:a16="http://schemas.microsoft.com/office/drawing/2014/main" id="{6DAAABB9-5B29-9540-9B95-C6AE440332B1}"/>
               </a:ext>
             </a:extLst>
           </p:cNvPr>
@@ -10853,7 +10903,7 @@
           <p:cNvPr id="2" name="Titel 1">
             <a:extLst>
               <a:ext uri="{FF2B5EF4-FFF2-40B4-BE49-F238E27FC236}">
-                <a16:creationId xmlns:a16="http://schemas.microsoft.com/office/drawing/2014/main" id="{7BA8FE41-0B04-6748-9CA8-05F0AE81883B}"/>
+                <a16:creationId xmlns="" xmlns:a16="http://schemas.microsoft.com/office/drawing/2014/main" id="{7BA8FE41-0B04-6748-9CA8-05F0AE81883B}"/>
               </a:ext>
             </a:extLst>
           </p:cNvPr>
@@ -10886,7 +10936,7 @@
           <p:cNvPr id="12" name="Gruppieren 11">
             <a:extLst>
               <a:ext uri="{FF2B5EF4-FFF2-40B4-BE49-F238E27FC236}">
-                <a16:creationId xmlns:a16="http://schemas.microsoft.com/office/drawing/2014/main" id="{995F115A-CBCD-7A4D-8C0A-281259A5A3C1}"/>
+                <a16:creationId xmlns="" xmlns:a16="http://schemas.microsoft.com/office/drawing/2014/main" id="{995F115A-CBCD-7A4D-8C0A-281259A5A3C1}"/>
               </a:ext>
             </a:extLst>
           </p:cNvPr>
@@ -10906,7 +10956,7 @@
             <p:cNvPr id="4" name="Gruppieren 3">
               <a:extLst>
                 <a:ext uri="{FF2B5EF4-FFF2-40B4-BE49-F238E27FC236}">
-                  <a16:creationId xmlns:a16="http://schemas.microsoft.com/office/drawing/2014/main" id="{783A73D2-C025-644E-A194-3438D291D352}"/>
+                  <a16:creationId xmlns="" xmlns:a16="http://schemas.microsoft.com/office/drawing/2014/main" id="{783A73D2-C025-644E-A194-3438D291D352}"/>
                 </a:ext>
               </a:extLst>
             </p:cNvPr>
@@ -10926,7 +10976,7 @@
               <p:cNvPr id="5" name="Rechteck 4">
                 <a:extLst>
                   <a:ext uri="{FF2B5EF4-FFF2-40B4-BE49-F238E27FC236}">
-                    <a16:creationId xmlns:a16="http://schemas.microsoft.com/office/drawing/2014/main" id="{4F68B8E9-417E-0141-AE27-E298ED29929C}"/>
+                    <a16:creationId xmlns="" xmlns:a16="http://schemas.microsoft.com/office/drawing/2014/main" id="{4F68B8E9-417E-0141-AE27-E298ED29929C}"/>
                   </a:ext>
                 </a:extLst>
               </p:cNvPr>
@@ -11018,7 +11068,7 @@
               <p:cNvPr id="6" name="Rechteck 5">
                 <a:extLst>
                   <a:ext uri="{FF2B5EF4-FFF2-40B4-BE49-F238E27FC236}">
-                    <a16:creationId xmlns:a16="http://schemas.microsoft.com/office/drawing/2014/main" id="{B2717A64-B61E-B44C-B23D-CB509FB519CA}"/>
+                    <a16:creationId xmlns="" xmlns:a16="http://schemas.microsoft.com/office/drawing/2014/main" id="{B2717A64-B61E-B44C-B23D-CB509FB519CA}"/>
                   </a:ext>
                 </a:extLst>
               </p:cNvPr>
@@ -11077,7 +11127,7 @@
             <p:cNvPr id="7" name="Rechteck 6">
               <a:extLst>
                 <a:ext uri="{FF2B5EF4-FFF2-40B4-BE49-F238E27FC236}">
-                  <a16:creationId xmlns:a16="http://schemas.microsoft.com/office/drawing/2014/main" id="{6F92A16E-30FA-A34D-A87A-AD884881288C}"/>
+                  <a16:creationId xmlns="" xmlns:a16="http://schemas.microsoft.com/office/drawing/2014/main" id="{6F92A16E-30FA-A34D-A87A-AD884881288C}"/>
                 </a:ext>
               </a:extLst>
             </p:cNvPr>
@@ -11137,7 +11187,7 @@
           <p:cNvPr id="13" name="Gruppieren 12">
             <a:extLst>
               <a:ext uri="{FF2B5EF4-FFF2-40B4-BE49-F238E27FC236}">
-                <a16:creationId xmlns:a16="http://schemas.microsoft.com/office/drawing/2014/main" id="{214C6E04-BA76-3048-B247-843530C6F237}"/>
+                <a16:creationId xmlns="" xmlns:a16="http://schemas.microsoft.com/office/drawing/2014/main" id="{214C6E04-BA76-3048-B247-843530C6F237}"/>
               </a:ext>
             </a:extLst>
           </p:cNvPr>
@@ -11157,7 +11207,7 @@
             <p:cNvPr id="14" name="Gruppieren 13">
               <a:extLst>
                 <a:ext uri="{FF2B5EF4-FFF2-40B4-BE49-F238E27FC236}">
-                  <a16:creationId xmlns:a16="http://schemas.microsoft.com/office/drawing/2014/main" id="{CF154C31-9B1A-6844-82C6-BEC64AE64B76}"/>
+                  <a16:creationId xmlns="" xmlns:a16="http://schemas.microsoft.com/office/drawing/2014/main" id="{CF154C31-9B1A-6844-82C6-BEC64AE64B76}"/>
                 </a:ext>
               </a:extLst>
             </p:cNvPr>
@@ -11177,7 +11227,7 @@
               <p:cNvPr id="16" name="Rechteck 15">
                 <a:extLst>
                   <a:ext uri="{FF2B5EF4-FFF2-40B4-BE49-F238E27FC236}">
-                    <a16:creationId xmlns:a16="http://schemas.microsoft.com/office/drawing/2014/main" id="{5D41E86D-96E1-F64F-B645-811FEF9C3566}"/>
+                    <a16:creationId xmlns="" xmlns:a16="http://schemas.microsoft.com/office/drawing/2014/main" id="{5D41E86D-96E1-F64F-B645-811FEF9C3566}"/>
                   </a:ext>
                 </a:extLst>
               </p:cNvPr>
@@ -11299,7 +11349,7 @@
               <p:cNvPr id="17" name="Rechteck 16">
                 <a:extLst>
                   <a:ext uri="{FF2B5EF4-FFF2-40B4-BE49-F238E27FC236}">
-                    <a16:creationId xmlns:a16="http://schemas.microsoft.com/office/drawing/2014/main" id="{829E215D-25C5-FE42-A84B-E10BE5590901}"/>
+                    <a16:creationId xmlns="" xmlns:a16="http://schemas.microsoft.com/office/drawing/2014/main" id="{829E215D-25C5-FE42-A84B-E10BE5590901}"/>
                   </a:ext>
                 </a:extLst>
               </p:cNvPr>
@@ -11358,7 +11408,7 @@
             <p:cNvPr id="15" name="Rechteck 14">
               <a:extLst>
                 <a:ext uri="{FF2B5EF4-FFF2-40B4-BE49-F238E27FC236}">
-                  <a16:creationId xmlns:a16="http://schemas.microsoft.com/office/drawing/2014/main" id="{3D7F9058-E672-2A4D-9BB1-013BCCC5ACE0}"/>
+                  <a16:creationId xmlns="" xmlns:a16="http://schemas.microsoft.com/office/drawing/2014/main" id="{3D7F9058-E672-2A4D-9BB1-013BCCC5ACE0}"/>
                 </a:ext>
               </a:extLst>
             </p:cNvPr>
@@ -11418,7 +11468,7 @@
           <p:cNvPr id="18" name="Gruppieren 17">
             <a:extLst>
               <a:ext uri="{FF2B5EF4-FFF2-40B4-BE49-F238E27FC236}">
-                <a16:creationId xmlns:a16="http://schemas.microsoft.com/office/drawing/2014/main" id="{76C873CF-9A61-9B4A-9A7F-7A0A6A11ECCC}"/>
+                <a16:creationId xmlns="" xmlns:a16="http://schemas.microsoft.com/office/drawing/2014/main" id="{76C873CF-9A61-9B4A-9A7F-7A0A6A11ECCC}"/>
               </a:ext>
             </a:extLst>
           </p:cNvPr>
@@ -11438,7 +11488,7 @@
             <p:cNvPr id="19" name="Gruppieren 18">
               <a:extLst>
                 <a:ext uri="{FF2B5EF4-FFF2-40B4-BE49-F238E27FC236}">
-                  <a16:creationId xmlns:a16="http://schemas.microsoft.com/office/drawing/2014/main" id="{02621200-51DD-6A4C-86C6-6B2A72D512E2}"/>
+                  <a16:creationId xmlns="" xmlns:a16="http://schemas.microsoft.com/office/drawing/2014/main" id="{02621200-51DD-6A4C-86C6-6B2A72D512E2}"/>
                 </a:ext>
               </a:extLst>
             </p:cNvPr>
@@ -11458,7 +11508,7 @@
               <p:cNvPr id="21" name="Rechteck 20">
                 <a:extLst>
                   <a:ext uri="{FF2B5EF4-FFF2-40B4-BE49-F238E27FC236}">
-                    <a16:creationId xmlns:a16="http://schemas.microsoft.com/office/drawing/2014/main" id="{ED0E09EA-1DC6-1249-841E-901E17F3D0B6}"/>
+                    <a16:creationId xmlns="" xmlns:a16="http://schemas.microsoft.com/office/drawing/2014/main" id="{ED0E09EA-1DC6-1249-841E-901E17F3D0B6}"/>
                   </a:ext>
                 </a:extLst>
               </p:cNvPr>
@@ -11538,7 +11588,7 @@
               <p:cNvPr id="22" name="Rechteck 21">
                 <a:extLst>
                   <a:ext uri="{FF2B5EF4-FFF2-40B4-BE49-F238E27FC236}">
-                    <a16:creationId xmlns:a16="http://schemas.microsoft.com/office/drawing/2014/main" id="{753356B5-7EB8-3F4A-96E1-8FF10B332D06}"/>
+                    <a16:creationId xmlns="" xmlns:a16="http://schemas.microsoft.com/office/drawing/2014/main" id="{753356B5-7EB8-3F4A-96E1-8FF10B332D06}"/>
                   </a:ext>
                 </a:extLst>
               </p:cNvPr>
@@ -11597,7 +11647,7 @@
             <p:cNvPr id="20" name="Rechteck 19">
               <a:extLst>
                 <a:ext uri="{FF2B5EF4-FFF2-40B4-BE49-F238E27FC236}">
-                  <a16:creationId xmlns:a16="http://schemas.microsoft.com/office/drawing/2014/main" id="{63DF4C62-579D-3249-9CFF-878DBD32F80A}"/>
+                  <a16:creationId xmlns="" xmlns:a16="http://schemas.microsoft.com/office/drawing/2014/main" id="{63DF4C62-579D-3249-9CFF-878DBD32F80A}"/>
                 </a:ext>
               </a:extLst>
             </p:cNvPr>
@@ -11657,7 +11707,7 @@
           <p:cNvPr id="23" name="Gruppieren 22">
             <a:extLst>
               <a:ext uri="{FF2B5EF4-FFF2-40B4-BE49-F238E27FC236}">
-                <a16:creationId xmlns:a16="http://schemas.microsoft.com/office/drawing/2014/main" id="{8E929239-873F-A040-A4FF-CF41E574A33B}"/>
+                <a16:creationId xmlns="" xmlns:a16="http://schemas.microsoft.com/office/drawing/2014/main" id="{8E929239-873F-A040-A4FF-CF41E574A33B}"/>
               </a:ext>
             </a:extLst>
           </p:cNvPr>
@@ -11677,7 +11727,7 @@
             <p:cNvPr id="24" name="Gruppieren 23">
               <a:extLst>
                 <a:ext uri="{FF2B5EF4-FFF2-40B4-BE49-F238E27FC236}">
-                  <a16:creationId xmlns:a16="http://schemas.microsoft.com/office/drawing/2014/main" id="{F47E6093-9AA6-8F4B-B80B-776943FCB73D}"/>
+                  <a16:creationId xmlns="" xmlns:a16="http://schemas.microsoft.com/office/drawing/2014/main" id="{F47E6093-9AA6-8F4B-B80B-776943FCB73D}"/>
                 </a:ext>
               </a:extLst>
             </p:cNvPr>
@@ -11697,7 +11747,7 @@
               <p:cNvPr id="26" name="Rechteck 25">
                 <a:extLst>
                   <a:ext uri="{FF2B5EF4-FFF2-40B4-BE49-F238E27FC236}">
-                    <a16:creationId xmlns:a16="http://schemas.microsoft.com/office/drawing/2014/main" id="{4059FEBC-2EFF-ED47-98FF-010C8401FADA}"/>
+                    <a16:creationId xmlns="" xmlns:a16="http://schemas.microsoft.com/office/drawing/2014/main" id="{4059FEBC-2EFF-ED47-98FF-010C8401FADA}"/>
                   </a:ext>
                 </a:extLst>
               </p:cNvPr>
@@ -11810,7 +11860,7 @@
               <p:cNvPr id="27" name="Rechteck 26">
                 <a:extLst>
                   <a:ext uri="{FF2B5EF4-FFF2-40B4-BE49-F238E27FC236}">
-                    <a16:creationId xmlns:a16="http://schemas.microsoft.com/office/drawing/2014/main" id="{A6C74FE9-D83D-2346-A400-58BA4229E830}"/>
+                    <a16:creationId xmlns="" xmlns:a16="http://schemas.microsoft.com/office/drawing/2014/main" id="{A6C74FE9-D83D-2346-A400-58BA4229E830}"/>
                   </a:ext>
                 </a:extLst>
               </p:cNvPr>
@@ -11869,7 +11919,7 @@
             <p:cNvPr id="25" name="Rechteck 24">
               <a:extLst>
                 <a:ext uri="{FF2B5EF4-FFF2-40B4-BE49-F238E27FC236}">
-                  <a16:creationId xmlns:a16="http://schemas.microsoft.com/office/drawing/2014/main" id="{1EDE063D-852E-324C-A77E-EFB1A1CCD783}"/>
+                  <a16:creationId xmlns="" xmlns:a16="http://schemas.microsoft.com/office/drawing/2014/main" id="{1EDE063D-852E-324C-A77E-EFB1A1CCD783}"/>
                 </a:ext>
               </a:extLst>
             </p:cNvPr>
@@ -11929,7 +11979,7 @@
           <p:cNvPr id="28" name="Gruppieren 27">
             <a:extLst>
               <a:ext uri="{FF2B5EF4-FFF2-40B4-BE49-F238E27FC236}">
-                <a16:creationId xmlns:a16="http://schemas.microsoft.com/office/drawing/2014/main" id="{076AA3C9-476D-4D45-B8BE-E0951E23CBCF}"/>
+                <a16:creationId xmlns="" xmlns:a16="http://schemas.microsoft.com/office/drawing/2014/main" id="{076AA3C9-476D-4D45-B8BE-E0951E23CBCF}"/>
               </a:ext>
             </a:extLst>
           </p:cNvPr>
@@ -11949,7 +11999,7 @@
             <p:cNvPr id="29" name="Gruppieren 28">
               <a:extLst>
                 <a:ext uri="{FF2B5EF4-FFF2-40B4-BE49-F238E27FC236}">
-                  <a16:creationId xmlns:a16="http://schemas.microsoft.com/office/drawing/2014/main" id="{B404C1CC-6DF7-B648-9CCB-5E2E9AFEB672}"/>
+                  <a16:creationId xmlns="" xmlns:a16="http://schemas.microsoft.com/office/drawing/2014/main" id="{B404C1CC-6DF7-B648-9CCB-5E2E9AFEB672}"/>
                 </a:ext>
               </a:extLst>
             </p:cNvPr>
@@ -11969,7 +12019,7 @@
               <p:cNvPr id="31" name="Rechteck 30">
                 <a:extLst>
                   <a:ext uri="{FF2B5EF4-FFF2-40B4-BE49-F238E27FC236}">
-                    <a16:creationId xmlns:a16="http://schemas.microsoft.com/office/drawing/2014/main" id="{4BDB37D7-D054-A942-8D6D-F9B2EF0F9FF6}"/>
+                    <a16:creationId xmlns="" xmlns:a16="http://schemas.microsoft.com/office/drawing/2014/main" id="{4BDB37D7-D054-A942-8D6D-F9B2EF0F9FF6}"/>
                   </a:ext>
                 </a:extLst>
               </p:cNvPr>
@@ -12024,7 +12074,7 @@
               <p:cNvPr id="32" name="Rechteck 31">
                 <a:extLst>
                   <a:ext uri="{FF2B5EF4-FFF2-40B4-BE49-F238E27FC236}">
-                    <a16:creationId xmlns:a16="http://schemas.microsoft.com/office/drawing/2014/main" id="{3A6CCD76-DF2E-A745-8BA8-2A2DA3CA1050}"/>
+                    <a16:creationId xmlns="" xmlns:a16="http://schemas.microsoft.com/office/drawing/2014/main" id="{3A6CCD76-DF2E-A745-8BA8-2A2DA3CA1050}"/>
                   </a:ext>
                 </a:extLst>
               </p:cNvPr>
@@ -12083,7 +12133,7 @@
             <p:cNvPr id="30" name="Rechteck 29">
               <a:extLst>
                 <a:ext uri="{FF2B5EF4-FFF2-40B4-BE49-F238E27FC236}">
-                  <a16:creationId xmlns:a16="http://schemas.microsoft.com/office/drawing/2014/main" id="{117072ED-37EF-E943-B866-F06DD4235CB3}"/>
+                  <a16:creationId xmlns="" xmlns:a16="http://schemas.microsoft.com/office/drawing/2014/main" id="{117072ED-37EF-E943-B866-F06DD4235CB3}"/>
                 </a:ext>
               </a:extLst>
             </p:cNvPr>
@@ -12244,7 +12294,7 @@
           <p:cNvPr id="2" name="Titel 1">
             <a:extLst>
               <a:ext uri="{FF2B5EF4-FFF2-40B4-BE49-F238E27FC236}">
-                <a16:creationId xmlns:a16="http://schemas.microsoft.com/office/drawing/2014/main" id="{565721FC-DA9D-7F4A-AC0A-E966CE252A2E}"/>
+                <a16:creationId xmlns="" xmlns:a16="http://schemas.microsoft.com/office/drawing/2014/main" id="{565721FC-DA9D-7F4A-AC0A-E966CE252A2E}"/>
               </a:ext>
             </a:extLst>
           </p:cNvPr>
@@ -12276,7 +12326,7 @@
           <p:cNvPr id="7" name="Grafik 6">
             <a:extLst>
               <a:ext uri="{FF2B5EF4-FFF2-40B4-BE49-F238E27FC236}">
-                <a16:creationId xmlns:a16="http://schemas.microsoft.com/office/drawing/2014/main" id="{496E9BA1-997F-8A42-8359-8118CAA4F8B8}"/>
+                <a16:creationId xmlns="" xmlns:a16="http://schemas.microsoft.com/office/drawing/2014/main" id="{496E9BA1-997F-8A42-8359-8118CAA4F8B8}"/>
               </a:ext>
             </a:extLst>
           </p:cNvPr>
@@ -12312,7 +12362,7 @@
           <p:cNvPr id="24" name="Oval 23">
             <a:extLst>
               <a:ext uri="{FF2B5EF4-FFF2-40B4-BE49-F238E27FC236}">
-                <a16:creationId xmlns:a16="http://schemas.microsoft.com/office/drawing/2014/main" id="{7BEF158B-37D7-804E-8706-2F4AC3084EAE}"/>
+                <a16:creationId xmlns="" xmlns:a16="http://schemas.microsoft.com/office/drawing/2014/main" id="{7BEF158B-37D7-804E-8706-2F4AC3084EAE}"/>
               </a:ext>
             </a:extLst>
           </p:cNvPr>
@@ -12364,7 +12414,7 @@
           <p:cNvPr id="25" name="Oval 24">
             <a:extLst>
               <a:ext uri="{FF2B5EF4-FFF2-40B4-BE49-F238E27FC236}">
-                <a16:creationId xmlns:a16="http://schemas.microsoft.com/office/drawing/2014/main" id="{507E0D37-7C93-BC4A-AD0C-ABE98E968974}"/>
+                <a16:creationId xmlns="" xmlns:a16="http://schemas.microsoft.com/office/drawing/2014/main" id="{507E0D37-7C93-BC4A-AD0C-ABE98E968974}"/>
               </a:ext>
             </a:extLst>
           </p:cNvPr>
@@ -12416,7 +12466,7 @@
           <p:cNvPr id="26" name="Oval 25">
             <a:extLst>
               <a:ext uri="{FF2B5EF4-FFF2-40B4-BE49-F238E27FC236}">
-                <a16:creationId xmlns:a16="http://schemas.microsoft.com/office/drawing/2014/main" id="{5149A216-9FF4-6B4B-8F2B-828C3DDFA3AF}"/>
+                <a16:creationId xmlns="" xmlns:a16="http://schemas.microsoft.com/office/drawing/2014/main" id="{5149A216-9FF4-6B4B-8F2B-828C3DDFA3AF}"/>
               </a:ext>
             </a:extLst>
           </p:cNvPr>
@@ -12470,7 +12520,7 @@
               <p14:cNvPr id="43" name="Freihand 42">
                 <a:extLst>
                   <a:ext uri="{FF2B5EF4-FFF2-40B4-BE49-F238E27FC236}">
-                    <a16:creationId xmlns:a16="http://schemas.microsoft.com/office/drawing/2014/main" id="{A0E82E8C-EC6D-9349-9BFA-4A3A2CDCC1E4}"/>
+                    <a16:creationId xmlns="" xmlns:a16="http://schemas.microsoft.com/office/drawing/2014/main" id="{A0E82E8C-EC6D-9349-9BFA-4A3A2CDCC1E4}"/>
                   </a:ext>
                 </a:extLst>
               </p14:cNvPr>
@@ -12521,7 +12571,7 @@
               <p14:cNvPr id="44" name="Freihand 43">
                 <a:extLst>
                   <a:ext uri="{FF2B5EF4-FFF2-40B4-BE49-F238E27FC236}">
-                    <a16:creationId xmlns:a16="http://schemas.microsoft.com/office/drawing/2014/main" id="{E50D5434-2140-FA4B-BC8C-7CE04AB8EE66}"/>
+                    <a16:creationId xmlns="" xmlns:a16="http://schemas.microsoft.com/office/drawing/2014/main" id="{E50D5434-2140-FA4B-BC8C-7CE04AB8EE66}"/>
                   </a:ext>
                 </a:extLst>
               </p14:cNvPr>
@@ -12572,7 +12622,7 @@
               <p14:cNvPr id="47" name="Freihand 46">
                 <a:extLst>
                   <a:ext uri="{FF2B5EF4-FFF2-40B4-BE49-F238E27FC236}">
-                    <a16:creationId xmlns:a16="http://schemas.microsoft.com/office/drawing/2014/main" id="{27A900A0-707B-0345-98E5-AFA26F328408}"/>
+                    <a16:creationId xmlns="" xmlns:a16="http://schemas.microsoft.com/office/drawing/2014/main" id="{27A900A0-707B-0345-98E5-AFA26F328408}"/>
                   </a:ext>
                 </a:extLst>
               </p14:cNvPr>
@@ -12621,7 +12671,7 @@
           <p:cNvPr id="49" name="Abgerundete rechteckige Legende 48">
             <a:extLst>
               <a:ext uri="{FF2B5EF4-FFF2-40B4-BE49-F238E27FC236}">
-                <a16:creationId xmlns:a16="http://schemas.microsoft.com/office/drawing/2014/main" id="{C3CD6BDE-7299-4D4A-B8A9-C380C4D21852}"/>
+                <a16:creationId xmlns="" xmlns:a16="http://schemas.microsoft.com/office/drawing/2014/main" id="{C3CD6BDE-7299-4D4A-B8A9-C380C4D21852}"/>
               </a:ext>
             </a:extLst>
           </p:cNvPr>
@@ -12691,7 +12741,7 @@
           <p:cNvPr id="50" name="Textfeld 49">
             <a:extLst>
               <a:ext uri="{FF2B5EF4-FFF2-40B4-BE49-F238E27FC236}">
-                <a16:creationId xmlns:a16="http://schemas.microsoft.com/office/drawing/2014/main" id="{74812B0A-9F6B-3B44-B974-C1947644856D}"/>
+                <a16:creationId xmlns="" xmlns:a16="http://schemas.microsoft.com/office/drawing/2014/main" id="{74812B0A-9F6B-3B44-B974-C1947644856D}"/>
               </a:ext>
             </a:extLst>
           </p:cNvPr>
@@ -12726,7 +12776,7 @@
           <p:cNvPr id="52" name="Wolkenförmige Legende 51">
             <a:extLst>
               <a:ext uri="{FF2B5EF4-FFF2-40B4-BE49-F238E27FC236}">
-                <a16:creationId xmlns:a16="http://schemas.microsoft.com/office/drawing/2014/main" id="{29DB6461-09BA-4847-ADB9-C5C694AA482B}"/>
+                <a16:creationId xmlns="" xmlns:a16="http://schemas.microsoft.com/office/drawing/2014/main" id="{29DB6461-09BA-4847-ADB9-C5C694AA482B}"/>
               </a:ext>
             </a:extLst>
           </p:cNvPr>
@@ -12780,7 +12830,7 @@
           <p:cNvPr id="53" name="Oval 52">
             <a:extLst>
               <a:ext uri="{FF2B5EF4-FFF2-40B4-BE49-F238E27FC236}">
-                <a16:creationId xmlns:a16="http://schemas.microsoft.com/office/drawing/2014/main" id="{A7F525C7-2BB3-7741-BE0A-A91605F6B414}"/>
+                <a16:creationId xmlns="" xmlns:a16="http://schemas.microsoft.com/office/drawing/2014/main" id="{A7F525C7-2BB3-7741-BE0A-A91605F6B414}"/>
               </a:ext>
             </a:extLst>
           </p:cNvPr>
@@ -12832,7 +12882,7 @@
           <p:cNvPr id="54" name="Oval 53">
             <a:extLst>
               <a:ext uri="{FF2B5EF4-FFF2-40B4-BE49-F238E27FC236}">
-                <a16:creationId xmlns:a16="http://schemas.microsoft.com/office/drawing/2014/main" id="{7A84F289-E89F-8342-8791-347A0E4F5BF9}"/>
+                <a16:creationId xmlns="" xmlns:a16="http://schemas.microsoft.com/office/drawing/2014/main" id="{7A84F289-E89F-8342-8791-347A0E4F5BF9}"/>
               </a:ext>
             </a:extLst>
           </p:cNvPr>
@@ -12884,7 +12934,7 @@
           <p:cNvPr id="55" name="Oval 54">
             <a:extLst>
               <a:ext uri="{FF2B5EF4-FFF2-40B4-BE49-F238E27FC236}">
-                <a16:creationId xmlns:a16="http://schemas.microsoft.com/office/drawing/2014/main" id="{A65E12B4-4201-2148-B5CA-CF3C353E009F}"/>
+                <a16:creationId xmlns="" xmlns:a16="http://schemas.microsoft.com/office/drawing/2014/main" id="{A65E12B4-4201-2148-B5CA-CF3C353E009F}"/>
               </a:ext>
             </a:extLst>
           </p:cNvPr>
@@ -12938,7 +12988,7 @@
               <p14:cNvPr id="56" name="Freihand 55">
                 <a:extLst>
                   <a:ext uri="{FF2B5EF4-FFF2-40B4-BE49-F238E27FC236}">
-                    <a16:creationId xmlns:a16="http://schemas.microsoft.com/office/drawing/2014/main" id="{5B3C06F8-598F-844F-A3A1-C175A796CC1F}"/>
+                    <a16:creationId xmlns="" xmlns:a16="http://schemas.microsoft.com/office/drawing/2014/main" id="{5B3C06F8-598F-844F-A3A1-C175A796CC1F}"/>
                   </a:ext>
                 </a:extLst>
               </p14:cNvPr>
@@ -12989,7 +13039,7 @@
               <p14:cNvPr id="60" name="Freihand 59">
                 <a:extLst>
                   <a:ext uri="{FF2B5EF4-FFF2-40B4-BE49-F238E27FC236}">
-                    <a16:creationId xmlns:a16="http://schemas.microsoft.com/office/drawing/2014/main" id="{082C1878-4FC7-A046-A15C-155DA5A4994F}"/>
+                    <a16:creationId xmlns="" xmlns:a16="http://schemas.microsoft.com/office/drawing/2014/main" id="{082C1878-4FC7-A046-A15C-155DA5A4994F}"/>
                   </a:ext>
                 </a:extLst>
               </p14:cNvPr>
@@ -13040,7 +13090,7 @@
               <p14:cNvPr id="61" name="Freihand 60">
                 <a:extLst>
                   <a:ext uri="{FF2B5EF4-FFF2-40B4-BE49-F238E27FC236}">
-                    <a16:creationId xmlns:a16="http://schemas.microsoft.com/office/drawing/2014/main" id="{4493D0F5-C439-AB47-A7AB-C5899EB6F429}"/>
+                    <a16:creationId xmlns="" xmlns:a16="http://schemas.microsoft.com/office/drawing/2014/main" id="{4493D0F5-C439-AB47-A7AB-C5899EB6F429}"/>
                   </a:ext>
                 </a:extLst>
               </p14:cNvPr>
@@ -13091,7 +13141,7 @@
               <p14:cNvPr id="62" name="Freihand 61">
                 <a:extLst>
                   <a:ext uri="{FF2B5EF4-FFF2-40B4-BE49-F238E27FC236}">
-                    <a16:creationId xmlns:a16="http://schemas.microsoft.com/office/drawing/2014/main" id="{748AF862-0F58-C846-9997-89FE1E796ACE}"/>
+                    <a16:creationId xmlns="" xmlns:a16="http://schemas.microsoft.com/office/drawing/2014/main" id="{748AF862-0F58-C846-9997-89FE1E796ACE}"/>
                   </a:ext>
                 </a:extLst>
               </p14:cNvPr>
@@ -13140,7 +13190,7 @@
           <p:cNvPr id="65" name="Textfeld 64">
             <a:extLst>
               <a:ext uri="{FF2B5EF4-FFF2-40B4-BE49-F238E27FC236}">
-                <a16:creationId xmlns:a16="http://schemas.microsoft.com/office/drawing/2014/main" id="{78AA0267-66A5-6246-A3BD-117F333C6256}"/>
+                <a16:creationId xmlns="" xmlns:a16="http://schemas.microsoft.com/office/drawing/2014/main" id="{78AA0267-66A5-6246-A3BD-117F333C6256}"/>
               </a:ext>
             </a:extLst>
           </p:cNvPr>
@@ -13183,7 +13233,7 @@
           <p:cNvPr id="23" name="Textfeld 22">
             <a:extLst>
               <a:ext uri="{FF2B5EF4-FFF2-40B4-BE49-F238E27FC236}">
-                <a16:creationId xmlns:a16="http://schemas.microsoft.com/office/drawing/2014/main" id="{74812B0A-9F6B-3B44-B974-C1947644856D}"/>
+                <a16:creationId xmlns="" xmlns:a16="http://schemas.microsoft.com/office/drawing/2014/main" id="{74812B0A-9F6B-3B44-B974-C1947644856D}"/>
               </a:ext>
             </a:extLst>
           </p:cNvPr>
@@ -13457,7 +13507,7 @@
           <p:cNvPr id="3" name="Untertitel 2">
             <a:extLst>
               <a:ext uri="{FF2B5EF4-FFF2-40B4-BE49-F238E27FC236}">
-                <a16:creationId xmlns:a16="http://schemas.microsoft.com/office/drawing/2014/main" id="{6AE9039D-A97A-1348-B85E-C1CBBAEACFD7}"/>
+                <a16:creationId xmlns="" xmlns:a16="http://schemas.microsoft.com/office/drawing/2014/main" id="{6AE9039D-A97A-1348-B85E-C1CBBAEACFD7}"/>
               </a:ext>
             </a:extLst>
           </p:cNvPr>
@@ -13505,7 +13555,7 @@
           <p:cNvPr id="2" name="Titel 1">
             <a:extLst>
               <a:ext uri="{FF2B5EF4-FFF2-40B4-BE49-F238E27FC236}">
-                <a16:creationId xmlns:a16="http://schemas.microsoft.com/office/drawing/2014/main" id="{306470B7-1C34-794F-AAAA-978C5A77B715}"/>
+                <a16:creationId xmlns="" xmlns:a16="http://schemas.microsoft.com/office/drawing/2014/main" id="{306470B7-1C34-794F-AAAA-978C5A77B715}"/>
               </a:ext>
             </a:extLst>
           </p:cNvPr>
@@ -13538,7 +13588,7 @@
           <p:cNvPr id="5" name="Grafik 4">
             <a:extLst>
               <a:ext uri="{FF2B5EF4-FFF2-40B4-BE49-F238E27FC236}">
-                <a16:creationId xmlns:a16="http://schemas.microsoft.com/office/drawing/2014/main" id="{8BFAE0AD-6B6F-7D46-B734-E35EC976BB2F}"/>
+                <a16:creationId xmlns="" xmlns:a16="http://schemas.microsoft.com/office/drawing/2014/main" id="{8BFAE0AD-6B6F-7D46-B734-E35EC976BB2F}"/>
               </a:ext>
             </a:extLst>
           </p:cNvPr>
@@ -13579,6 +13629,14 @@
   <p:clrMapOvr>
     <a:masterClrMapping/>
   </p:clrMapOvr>
+  <mc:AlternateContent xmlns:mc="http://schemas.openxmlformats.org/markup-compatibility/2006" xmlns:p14="http://schemas.microsoft.com/office/powerpoint/2010/main">
+    <mc:Choice Requires="p14">
+      <p:transition spd="slow" p14:dur="2000"/>
+    </mc:Choice>
+    <mc:Fallback xmlns="">
+      <p:transition spd="slow"/>
+    </mc:Fallback>
+  </mc:AlternateContent>
 </p:sld>
 </file>
 
@@ -13912,7 +13970,7 @@
           <p:cNvPr id="2" name="Titel 1">
             <a:extLst>
               <a:ext uri="{FF2B5EF4-FFF2-40B4-BE49-F238E27FC236}">
-                <a16:creationId xmlns:a16="http://schemas.microsoft.com/office/drawing/2014/main" id="{6D5AEAFE-EC04-F24C-A17A-158A347CC423}"/>
+                <a16:creationId xmlns="" xmlns:a16="http://schemas.microsoft.com/office/drawing/2014/main" id="{6D5AEAFE-EC04-F24C-A17A-158A347CC423}"/>
               </a:ext>
             </a:extLst>
           </p:cNvPr>
@@ -13940,7 +13998,7 @@
           <p:cNvPr id="9" name="Inhaltsplatzhalter 8">
             <a:extLst>
               <a:ext uri="{FF2B5EF4-FFF2-40B4-BE49-F238E27FC236}">
-                <a16:creationId xmlns:a16="http://schemas.microsoft.com/office/drawing/2014/main" id="{43E904B5-FC63-2245-8D6F-9995C0DEC09A}"/>
+                <a16:creationId xmlns="" xmlns:a16="http://schemas.microsoft.com/office/drawing/2014/main" id="{43E904B5-FC63-2245-8D6F-9995C0DEC09A}"/>
               </a:ext>
             </a:extLst>
           </p:cNvPr>
@@ -14005,7 +14063,7 @@
           <p:cNvPr id="2" name="Titel 1">
             <a:extLst>
               <a:ext uri="{FF2B5EF4-FFF2-40B4-BE49-F238E27FC236}">
-                <a16:creationId xmlns:a16="http://schemas.microsoft.com/office/drawing/2014/main" id="{DCFD5523-7851-A043-B6A9-AB16F57D85D1}"/>
+                <a16:creationId xmlns="" xmlns:a16="http://schemas.microsoft.com/office/drawing/2014/main" id="{DCFD5523-7851-A043-B6A9-AB16F57D85D1}"/>
               </a:ext>
             </a:extLst>
           </p:cNvPr>
@@ -14033,7 +14091,7 @@
           <p:cNvPr id="9" name="Inhaltsplatzhalter 8">
             <a:extLst>
               <a:ext uri="{FF2B5EF4-FFF2-40B4-BE49-F238E27FC236}">
-                <a16:creationId xmlns:a16="http://schemas.microsoft.com/office/drawing/2014/main" id="{4161DFCC-B7ED-104E-A55F-5805A7DFB48E}"/>
+                <a16:creationId xmlns="" xmlns:a16="http://schemas.microsoft.com/office/drawing/2014/main" id="{4161DFCC-B7ED-104E-A55F-5805A7DFB48E}"/>
               </a:ext>
             </a:extLst>
           </p:cNvPr>
@@ -14098,7 +14156,7 @@
           <p:cNvPr id="2" name="Titel 1">
             <a:extLst>
               <a:ext uri="{FF2B5EF4-FFF2-40B4-BE49-F238E27FC236}">
-                <a16:creationId xmlns:a16="http://schemas.microsoft.com/office/drawing/2014/main" id="{4408D667-F505-6949-BA79-5C28AA792F31}"/>
+                <a16:creationId xmlns="" xmlns:a16="http://schemas.microsoft.com/office/drawing/2014/main" id="{4408D667-F505-6949-BA79-5C28AA792F31}"/>
               </a:ext>
             </a:extLst>
           </p:cNvPr>
@@ -14126,7 +14184,7 @@
           <p:cNvPr id="9" name="Inhaltsplatzhalter 8">
             <a:extLst>
               <a:ext uri="{FF2B5EF4-FFF2-40B4-BE49-F238E27FC236}">
-                <a16:creationId xmlns:a16="http://schemas.microsoft.com/office/drawing/2014/main" id="{A5757A64-2FEB-194F-9D1D-E341434C0D34}"/>
+                <a16:creationId xmlns="" xmlns:a16="http://schemas.microsoft.com/office/drawing/2014/main" id="{A5757A64-2FEB-194F-9D1D-E341434C0D34}"/>
               </a:ext>
             </a:extLst>
           </p:cNvPr>
@@ -14191,7 +14249,7 @@
           <p:cNvPr id="2" name="Titel 1">
             <a:extLst>
               <a:ext uri="{FF2B5EF4-FFF2-40B4-BE49-F238E27FC236}">
-                <a16:creationId xmlns:a16="http://schemas.microsoft.com/office/drawing/2014/main" id="{D0623DED-DC16-7843-8D93-20186F3EC855}"/>
+                <a16:creationId xmlns="" xmlns:a16="http://schemas.microsoft.com/office/drawing/2014/main" id="{D0623DED-DC16-7843-8D93-20186F3EC855}"/>
               </a:ext>
             </a:extLst>
           </p:cNvPr>
@@ -14219,7 +14277,7 @@
           <p:cNvPr id="5" name="Inhaltsplatzhalter 4">
             <a:extLst>
               <a:ext uri="{FF2B5EF4-FFF2-40B4-BE49-F238E27FC236}">
-                <a16:creationId xmlns:a16="http://schemas.microsoft.com/office/drawing/2014/main" id="{3C05055E-ACB1-E04D-ABDF-725E50C20C83}"/>
+                <a16:creationId xmlns="" xmlns:a16="http://schemas.microsoft.com/office/drawing/2014/main" id="{3C05055E-ACB1-E04D-ABDF-725E50C20C83}"/>
               </a:ext>
             </a:extLst>
           </p:cNvPr>
@@ -14284,7 +14342,7 @@
           <p:cNvPr id="2" name="Titel 1">
             <a:extLst>
               <a:ext uri="{FF2B5EF4-FFF2-40B4-BE49-F238E27FC236}">
-                <a16:creationId xmlns:a16="http://schemas.microsoft.com/office/drawing/2014/main" id="{10587004-B7DF-5045-9C0B-0660C21B200E}"/>
+                <a16:creationId xmlns="" xmlns:a16="http://schemas.microsoft.com/office/drawing/2014/main" id="{10587004-B7DF-5045-9C0B-0660C21B200E}"/>
               </a:ext>
             </a:extLst>
           </p:cNvPr>
@@ -14312,7 +14370,7 @@
           <p:cNvPr id="9" name="Inhaltsplatzhalter 8">
             <a:extLst>
               <a:ext uri="{FF2B5EF4-FFF2-40B4-BE49-F238E27FC236}">
-                <a16:creationId xmlns:a16="http://schemas.microsoft.com/office/drawing/2014/main" id="{BA32FF54-8004-EC4C-B451-9DE95BCEFAC8}"/>
+                <a16:creationId xmlns="" xmlns:a16="http://schemas.microsoft.com/office/drawing/2014/main" id="{BA32FF54-8004-EC4C-B451-9DE95BCEFAC8}"/>
               </a:ext>
             </a:extLst>
           </p:cNvPr>
@@ -14377,7 +14435,7 @@
           <p:cNvPr id="2" name="Titel 1">
             <a:extLst>
               <a:ext uri="{FF2B5EF4-FFF2-40B4-BE49-F238E27FC236}">
-                <a16:creationId xmlns:a16="http://schemas.microsoft.com/office/drawing/2014/main" id="{9D53ED9D-320B-244E-B0A4-990B8FD6A869}"/>
+                <a16:creationId xmlns="" xmlns:a16="http://schemas.microsoft.com/office/drawing/2014/main" id="{9D53ED9D-320B-244E-B0A4-990B8FD6A869}"/>
               </a:ext>
             </a:extLst>
           </p:cNvPr>
@@ -14425,7 +14483,7 @@
           <p:cNvPr id="4" name="Gruppieren 3">
             <a:extLst>
               <a:ext uri="{FF2B5EF4-FFF2-40B4-BE49-F238E27FC236}">
-                <a16:creationId xmlns:a16="http://schemas.microsoft.com/office/drawing/2014/main" id="{783A73D2-C025-644E-A194-3438D291D352}"/>
+                <a16:creationId xmlns="" xmlns:a16="http://schemas.microsoft.com/office/drawing/2014/main" id="{783A73D2-C025-644E-A194-3438D291D352}"/>
               </a:ext>
             </a:extLst>
           </p:cNvPr>
@@ -14445,7 +14503,7 @@
             <p:cNvPr id="5" name="Rechteck 4">
               <a:extLst>
                 <a:ext uri="{FF2B5EF4-FFF2-40B4-BE49-F238E27FC236}">
-                  <a16:creationId xmlns:a16="http://schemas.microsoft.com/office/drawing/2014/main" id="{4F68B8E9-417E-0141-AE27-E298ED29929C}"/>
+                  <a16:creationId xmlns="" xmlns:a16="http://schemas.microsoft.com/office/drawing/2014/main" id="{4F68B8E9-417E-0141-AE27-E298ED29929C}"/>
                 </a:ext>
               </a:extLst>
             </p:cNvPr>
@@ -14529,7 +14587,7 @@
             <p:cNvPr id="6" name="Rechteck 5">
               <a:extLst>
                 <a:ext uri="{FF2B5EF4-FFF2-40B4-BE49-F238E27FC236}">
-                  <a16:creationId xmlns:a16="http://schemas.microsoft.com/office/drawing/2014/main" id="{B2717A64-B61E-B44C-B23D-CB509FB519CA}"/>
+                  <a16:creationId xmlns="" xmlns:a16="http://schemas.microsoft.com/office/drawing/2014/main" id="{B2717A64-B61E-B44C-B23D-CB509FB519CA}"/>
                 </a:ext>
               </a:extLst>
             </p:cNvPr>
@@ -14588,7 +14646,7 @@
           <p:cNvPr id="7" name="Gruppieren 6">
             <a:extLst>
               <a:ext uri="{FF2B5EF4-FFF2-40B4-BE49-F238E27FC236}">
-                <a16:creationId xmlns:a16="http://schemas.microsoft.com/office/drawing/2014/main" id="{783A73D2-C025-644E-A194-3438D291D352}"/>
+                <a16:creationId xmlns="" xmlns:a16="http://schemas.microsoft.com/office/drawing/2014/main" id="{783A73D2-C025-644E-A194-3438D291D352}"/>
               </a:ext>
             </a:extLst>
           </p:cNvPr>
@@ -14608,7 +14666,7 @@
             <p:cNvPr id="8" name="Rechteck 7">
               <a:extLst>
                 <a:ext uri="{FF2B5EF4-FFF2-40B4-BE49-F238E27FC236}">
-                  <a16:creationId xmlns:a16="http://schemas.microsoft.com/office/drawing/2014/main" id="{4F68B8E9-417E-0141-AE27-E298ED29929C}"/>
+                  <a16:creationId xmlns="" xmlns:a16="http://schemas.microsoft.com/office/drawing/2014/main" id="{4F68B8E9-417E-0141-AE27-E298ED29929C}"/>
                 </a:ext>
               </a:extLst>
             </p:cNvPr>
@@ -14717,7 +14775,7 @@
             <p:cNvPr id="9" name="Rechteck 8">
               <a:extLst>
                 <a:ext uri="{FF2B5EF4-FFF2-40B4-BE49-F238E27FC236}">
-                  <a16:creationId xmlns:a16="http://schemas.microsoft.com/office/drawing/2014/main" id="{B2717A64-B61E-B44C-B23D-CB509FB519CA}"/>
+                  <a16:creationId xmlns="" xmlns:a16="http://schemas.microsoft.com/office/drawing/2014/main" id="{B2717A64-B61E-B44C-B23D-CB509FB519CA}"/>
                 </a:ext>
               </a:extLst>
             </p:cNvPr>
@@ -14806,7 +14864,7 @@
           <p:cNvPr id="2" name="Titel 1">
             <a:extLst>
               <a:ext uri="{FF2B5EF4-FFF2-40B4-BE49-F238E27FC236}">
-                <a16:creationId xmlns:a16="http://schemas.microsoft.com/office/drawing/2014/main" id="{3358FD0C-BC9C-224A-97DC-50E85919ED2D}"/>
+                <a16:creationId xmlns="" xmlns:a16="http://schemas.microsoft.com/office/drawing/2014/main" id="{3358FD0C-BC9C-224A-97DC-50E85919ED2D}"/>
               </a:ext>
             </a:extLst>
           </p:cNvPr>
@@ -14839,7 +14897,7 @@
           <p:cNvPr id="5" name="Inhaltsplatzhalter 4">
             <a:extLst>
               <a:ext uri="{FF2B5EF4-FFF2-40B4-BE49-F238E27FC236}">
-                <a16:creationId xmlns:a16="http://schemas.microsoft.com/office/drawing/2014/main" id="{90D70A80-F13E-4148-9767-D676A4697649}"/>
+                <a16:creationId xmlns="" xmlns:a16="http://schemas.microsoft.com/office/drawing/2014/main" id="{90D70A80-F13E-4148-9767-D676A4697649}"/>
               </a:ext>
             </a:extLst>
           </p:cNvPr>
@@ -14904,7 +14962,7 @@
           <p:cNvPr id="2" name="Titel 1">
             <a:extLst>
               <a:ext uri="{FF2B5EF4-FFF2-40B4-BE49-F238E27FC236}">
-                <a16:creationId xmlns:a16="http://schemas.microsoft.com/office/drawing/2014/main" id="{72C746DA-5BDE-0D47-83E3-DB7A3A00BFD0}"/>
+                <a16:creationId xmlns="" xmlns:a16="http://schemas.microsoft.com/office/drawing/2014/main" id="{72C746DA-5BDE-0D47-83E3-DB7A3A00BFD0}"/>
               </a:ext>
             </a:extLst>
           </p:cNvPr>
@@ -14937,7 +14995,7 @@
           <p:cNvPr id="5" name="Inhaltsplatzhalter 4">
             <a:extLst>
               <a:ext uri="{FF2B5EF4-FFF2-40B4-BE49-F238E27FC236}">
-                <a16:creationId xmlns:a16="http://schemas.microsoft.com/office/drawing/2014/main" id="{EDCE88AD-E358-BB42-8E08-A95860B38BC9}"/>
+                <a16:creationId xmlns="" xmlns:a16="http://schemas.microsoft.com/office/drawing/2014/main" id="{EDCE88AD-E358-BB42-8E08-A95860B38BC9}"/>
               </a:ext>
             </a:extLst>
           </p:cNvPr>
@@ -17169,7 +17227,7 @@
           <p:cNvPr id="2" name="Titel 1">
             <a:extLst>
               <a:ext uri="{FF2B5EF4-FFF2-40B4-BE49-F238E27FC236}">
-                <a16:creationId xmlns:a16="http://schemas.microsoft.com/office/drawing/2014/main" id="{061E505A-8173-1347-AE02-C6C2BDD420BB}"/>
+                <a16:creationId xmlns="" xmlns:a16="http://schemas.microsoft.com/office/drawing/2014/main" id="{061E505A-8173-1347-AE02-C6C2BDD420BB}"/>
               </a:ext>
             </a:extLst>
           </p:cNvPr>
@@ -17197,7 +17255,7 @@
           <p:cNvPr id="6" name="Rechteck 5">
             <a:extLst>
               <a:ext uri="{FF2B5EF4-FFF2-40B4-BE49-F238E27FC236}">
-                <a16:creationId xmlns:a16="http://schemas.microsoft.com/office/drawing/2014/main" id="{4F68B8E9-417E-0141-AE27-E298ED29929C}"/>
+                <a16:creationId xmlns="" xmlns:a16="http://schemas.microsoft.com/office/drawing/2014/main" id="{4F68B8E9-417E-0141-AE27-E298ED29929C}"/>
               </a:ext>
             </a:extLst>
           </p:cNvPr>
@@ -17255,7 +17313,7 @@
           <p:cNvPr id="7" name="Rechteck 6">
             <a:extLst>
               <a:ext uri="{FF2B5EF4-FFF2-40B4-BE49-F238E27FC236}">
-                <a16:creationId xmlns:a16="http://schemas.microsoft.com/office/drawing/2014/main" id="{4F68B8E9-417E-0141-AE27-E298ED29929C}"/>
+                <a16:creationId xmlns="" xmlns:a16="http://schemas.microsoft.com/office/drawing/2014/main" id="{4F68B8E9-417E-0141-AE27-E298ED29929C}"/>
               </a:ext>
             </a:extLst>
           </p:cNvPr>
@@ -17313,7 +17371,7 @@
           <p:cNvPr id="8" name="Rechteck 7">
             <a:extLst>
               <a:ext uri="{FF2B5EF4-FFF2-40B4-BE49-F238E27FC236}">
-                <a16:creationId xmlns:a16="http://schemas.microsoft.com/office/drawing/2014/main" id="{4F68B8E9-417E-0141-AE27-E298ED29929C}"/>
+                <a16:creationId xmlns="" xmlns:a16="http://schemas.microsoft.com/office/drawing/2014/main" id="{4F68B8E9-417E-0141-AE27-E298ED29929C}"/>
               </a:ext>
             </a:extLst>
           </p:cNvPr>
@@ -17371,7 +17429,7 @@
           <p:cNvPr id="9" name="Rechteck 8">
             <a:extLst>
               <a:ext uri="{FF2B5EF4-FFF2-40B4-BE49-F238E27FC236}">
-                <a16:creationId xmlns:a16="http://schemas.microsoft.com/office/drawing/2014/main" id="{4F68B8E9-417E-0141-AE27-E298ED29929C}"/>
+                <a16:creationId xmlns="" xmlns:a16="http://schemas.microsoft.com/office/drawing/2014/main" id="{4F68B8E9-417E-0141-AE27-E298ED29929C}"/>
               </a:ext>
             </a:extLst>
           </p:cNvPr>
@@ -17429,7 +17487,7 @@
           <p:cNvPr id="10" name="Rechteck 9">
             <a:extLst>
               <a:ext uri="{FF2B5EF4-FFF2-40B4-BE49-F238E27FC236}">
-                <a16:creationId xmlns:a16="http://schemas.microsoft.com/office/drawing/2014/main" id="{4F68B8E9-417E-0141-AE27-E298ED29929C}"/>
+                <a16:creationId xmlns="" xmlns:a16="http://schemas.microsoft.com/office/drawing/2014/main" id="{4F68B8E9-417E-0141-AE27-E298ED29929C}"/>
               </a:ext>
             </a:extLst>
           </p:cNvPr>
@@ -17655,7 +17713,7 @@
           <p:cNvPr id="17" name="Oval 52">
             <a:extLst>
               <a:ext uri="{FF2B5EF4-FFF2-40B4-BE49-F238E27FC236}">
-                <a16:creationId xmlns:a16="http://schemas.microsoft.com/office/drawing/2014/main" id="{A7F525C7-2BB3-7741-BE0A-A91605F6B414}"/>
+                <a16:creationId xmlns="" xmlns:a16="http://schemas.microsoft.com/office/drawing/2014/main" id="{A7F525C7-2BB3-7741-BE0A-A91605F6B414}"/>
               </a:ext>
             </a:extLst>
           </p:cNvPr>
@@ -17707,7 +17765,7 @@
           <p:cNvPr id="22" name="Oval 54">
             <a:extLst>
               <a:ext uri="{FF2B5EF4-FFF2-40B4-BE49-F238E27FC236}">
-                <a16:creationId xmlns:a16="http://schemas.microsoft.com/office/drawing/2014/main" id="{A65E12B4-4201-2148-B5CA-CF3C353E009F}"/>
+                <a16:creationId xmlns="" xmlns:a16="http://schemas.microsoft.com/office/drawing/2014/main" id="{A65E12B4-4201-2148-B5CA-CF3C353E009F}"/>
               </a:ext>
             </a:extLst>
           </p:cNvPr>
@@ -17761,7 +17819,7 @@
               <p14:cNvPr id="23" name="Freihand 22">
                 <a:extLst>
                   <a:ext uri="{FF2B5EF4-FFF2-40B4-BE49-F238E27FC236}">
-                    <a16:creationId xmlns:a16="http://schemas.microsoft.com/office/drawing/2014/main" id="{5B3C06F8-598F-844F-A3A1-C175A796CC1F}"/>
+                    <a16:creationId xmlns="" xmlns:a16="http://schemas.microsoft.com/office/drawing/2014/main" id="{5B3C06F8-598F-844F-A3A1-C175A796CC1F}"/>
                   </a:ext>
                 </a:extLst>
               </p14:cNvPr>
@@ -17812,7 +17870,7 @@
               <p14:cNvPr id="24" name="Freihand 23">
                 <a:extLst>
                   <a:ext uri="{FF2B5EF4-FFF2-40B4-BE49-F238E27FC236}">
-                    <a16:creationId xmlns:a16="http://schemas.microsoft.com/office/drawing/2014/main" id="{082C1878-4FC7-A046-A15C-155DA5A4994F}"/>
+                    <a16:creationId xmlns="" xmlns:a16="http://schemas.microsoft.com/office/drawing/2014/main" id="{082C1878-4FC7-A046-A15C-155DA5A4994F}"/>
                   </a:ext>
                 </a:extLst>
               </p14:cNvPr>
@@ -17863,7 +17921,7 @@
               <p14:cNvPr id="25" name="Freihand 24">
                 <a:extLst>
                   <a:ext uri="{FF2B5EF4-FFF2-40B4-BE49-F238E27FC236}">
-                    <a16:creationId xmlns:a16="http://schemas.microsoft.com/office/drawing/2014/main" id="{4493D0F5-C439-AB47-A7AB-C5899EB6F429}"/>
+                    <a16:creationId xmlns="" xmlns:a16="http://schemas.microsoft.com/office/drawing/2014/main" id="{4493D0F5-C439-AB47-A7AB-C5899EB6F429}"/>
                   </a:ext>
                 </a:extLst>
               </p14:cNvPr>
@@ -17914,7 +17972,7 @@
               <p14:cNvPr id="26" name="Freihand 25">
                 <a:extLst>
                   <a:ext uri="{FF2B5EF4-FFF2-40B4-BE49-F238E27FC236}">
-                    <a16:creationId xmlns:a16="http://schemas.microsoft.com/office/drawing/2014/main" id="{748AF862-0F58-C846-9997-89FE1E796ACE}"/>
+                    <a16:creationId xmlns="" xmlns:a16="http://schemas.microsoft.com/office/drawing/2014/main" id="{748AF862-0F58-C846-9997-89FE1E796ACE}"/>
                   </a:ext>
                 </a:extLst>
               </p14:cNvPr>
@@ -17963,7 +18021,7 @@
           <p:cNvPr id="27" name="Textfeld 26">
             <a:extLst>
               <a:ext uri="{FF2B5EF4-FFF2-40B4-BE49-F238E27FC236}">
-                <a16:creationId xmlns:a16="http://schemas.microsoft.com/office/drawing/2014/main" id="{78AA0267-66A5-6246-A3BD-117F333C6256}"/>
+                <a16:creationId xmlns="" xmlns:a16="http://schemas.microsoft.com/office/drawing/2014/main" id="{78AA0267-66A5-6246-A3BD-117F333C6256}"/>
               </a:ext>
             </a:extLst>
           </p:cNvPr>
@@ -18006,7 +18064,7 @@
           <p:cNvPr id="28" name="Oval 53">
             <a:extLst>
               <a:ext uri="{FF2B5EF4-FFF2-40B4-BE49-F238E27FC236}">
-                <a16:creationId xmlns:a16="http://schemas.microsoft.com/office/drawing/2014/main" id="{7A84F289-E89F-8342-8791-347A0E4F5BF9}"/>
+                <a16:creationId xmlns="" xmlns:a16="http://schemas.microsoft.com/office/drawing/2014/main" id="{7A84F289-E89F-8342-8791-347A0E4F5BF9}"/>
               </a:ext>
             </a:extLst>
           </p:cNvPr>
@@ -18118,7 +18176,7 @@
           <p:cNvPr id="29" name="Gruppieren 28">
             <a:extLst>
               <a:ext uri="{FF2B5EF4-FFF2-40B4-BE49-F238E27FC236}">
-                <a16:creationId xmlns:a16="http://schemas.microsoft.com/office/drawing/2014/main" id="{A77C338F-8650-384E-BB9C-FC6D06C49338}"/>
+                <a16:creationId xmlns="" xmlns:a16="http://schemas.microsoft.com/office/drawing/2014/main" id="{A77C338F-8650-384E-BB9C-FC6D06C49338}"/>
               </a:ext>
             </a:extLst>
           </p:cNvPr>
@@ -18138,7 +18196,7 @@
             <p:cNvPr id="30" name="Grafik 29">
               <a:extLst>
                 <a:ext uri="{FF2B5EF4-FFF2-40B4-BE49-F238E27FC236}">
-                  <a16:creationId xmlns:a16="http://schemas.microsoft.com/office/drawing/2014/main" id="{EEDB8AC1-EF26-5F44-857F-1DB38F280D1D}"/>
+                  <a16:creationId xmlns="" xmlns:a16="http://schemas.microsoft.com/office/drawing/2014/main" id="{EEDB8AC1-EF26-5F44-857F-1DB38F280D1D}"/>
                 </a:ext>
               </a:extLst>
             </p:cNvPr>
@@ -18174,7 +18232,7 @@
             <p:cNvPr id="31" name="Inhaltsplatzhalter 3">
               <a:extLst>
                 <a:ext uri="{FF2B5EF4-FFF2-40B4-BE49-F238E27FC236}">
-                  <a16:creationId xmlns:a16="http://schemas.microsoft.com/office/drawing/2014/main" id="{14BB9544-174D-9A43-B0BF-1A3507EFFEFE}"/>
+                  <a16:creationId xmlns="" xmlns:a16="http://schemas.microsoft.com/office/drawing/2014/main" id="{14BB9544-174D-9A43-B0BF-1A3507EFFEFE}"/>
                 </a:ext>
               </a:extLst>
             </p:cNvPr>
@@ -18214,7 +18272,7 @@
           <p:cNvPr id="32" name="Oval 52">
             <a:extLst>
               <a:ext uri="{FF2B5EF4-FFF2-40B4-BE49-F238E27FC236}">
-                <a16:creationId xmlns:a16="http://schemas.microsoft.com/office/drawing/2014/main" id="{ED3A9451-5C13-454B-ACB8-D489D0C7D4AB}"/>
+                <a16:creationId xmlns="" xmlns:a16="http://schemas.microsoft.com/office/drawing/2014/main" id="{ED3A9451-5C13-454B-ACB8-D489D0C7D4AB}"/>
               </a:ext>
             </a:extLst>
           </p:cNvPr>
@@ -18266,7 +18324,7 @@
           <p:cNvPr id="33" name="Oval 53">
             <a:extLst>
               <a:ext uri="{FF2B5EF4-FFF2-40B4-BE49-F238E27FC236}">
-                <a16:creationId xmlns:a16="http://schemas.microsoft.com/office/drawing/2014/main" id="{EDFE795A-2C1F-CD4C-AA8A-86578AF55D7B}"/>
+                <a16:creationId xmlns="" xmlns:a16="http://schemas.microsoft.com/office/drawing/2014/main" id="{EDFE795A-2C1F-CD4C-AA8A-86578AF55D7B}"/>
               </a:ext>
             </a:extLst>
           </p:cNvPr>
@@ -18318,7 +18376,7 @@
           <p:cNvPr id="34" name="Oval 54">
             <a:extLst>
               <a:ext uri="{FF2B5EF4-FFF2-40B4-BE49-F238E27FC236}">
-                <a16:creationId xmlns:a16="http://schemas.microsoft.com/office/drawing/2014/main" id="{A555FAF6-FE8E-544C-A0F3-A5D90DFF709F}"/>
+                <a16:creationId xmlns="" xmlns:a16="http://schemas.microsoft.com/office/drawing/2014/main" id="{A555FAF6-FE8E-544C-A0F3-A5D90DFF709F}"/>
               </a:ext>
             </a:extLst>
           </p:cNvPr>
@@ -18365,14 +18423,14 @@
           </a:p>
         </p:txBody>
       </p:sp>
-      <mc:AlternateContent xmlns:mc="http://schemas.openxmlformats.org/markup-compatibility/2006">
-        <mc:Choice xmlns:p14="http://schemas.microsoft.com/office/powerpoint/2010/main" Requires="p14">
+      <mc:AlternateContent xmlns:mc="http://schemas.openxmlformats.org/markup-compatibility/2006" xmlns:p14="http://schemas.microsoft.com/office/powerpoint/2010/main">
+        <mc:Choice Requires="p14">
           <p:contentPart p14:bwMode="auto" r:id="rId13">
             <p14:nvContentPartPr>
               <p14:cNvPr id="35" name="Freihand 34">
                 <a:extLst>
                   <a:ext uri="{FF2B5EF4-FFF2-40B4-BE49-F238E27FC236}">
-                    <a16:creationId xmlns:a16="http://schemas.microsoft.com/office/drawing/2014/main" id="{E8A7C5B7-ECD5-6444-BB47-47F48498A6A9}"/>
+                    <a16:creationId xmlns="" xmlns:a16="http://schemas.microsoft.com/office/drawing/2014/main" id="{E8A7C5B7-ECD5-6444-BB47-47F48498A6A9}"/>
                   </a:ext>
                 </a:extLst>
               </p14:cNvPr>
@@ -18385,7 +18443,7 @@
             </p14:xfrm>
           </p:contentPart>
         </mc:Choice>
-        <mc:Fallback>
+        <mc:Fallback xmlns="">
           <p:pic>
             <p:nvPicPr>
               <p:cNvPr id="35" name="Freihand 34">
@@ -18416,14 +18474,14 @@
           </p:pic>
         </mc:Fallback>
       </mc:AlternateContent>
-      <mc:AlternateContent xmlns:mc="http://schemas.openxmlformats.org/markup-compatibility/2006">
-        <mc:Choice xmlns:p14="http://schemas.microsoft.com/office/powerpoint/2010/main" Requires="p14">
+      <mc:AlternateContent xmlns:mc="http://schemas.openxmlformats.org/markup-compatibility/2006" xmlns:p14="http://schemas.microsoft.com/office/powerpoint/2010/main">
+        <mc:Choice Requires="p14">
           <p:contentPart p14:bwMode="auto" r:id="rId15">
             <p14:nvContentPartPr>
               <p14:cNvPr id="36" name="Freihand 35">
                 <a:extLst>
                   <a:ext uri="{FF2B5EF4-FFF2-40B4-BE49-F238E27FC236}">
-                    <a16:creationId xmlns:a16="http://schemas.microsoft.com/office/drawing/2014/main" id="{DDBDCF4E-2B8E-4845-A970-DB0F0B101601}"/>
+                    <a16:creationId xmlns="" xmlns:a16="http://schemas.microsoft.com/office/drawing/2014/main" id="{DDBDCF4E-2B8E-4845-A970-DB0F0B101601}"/>
                   </a:ext>
                 </a:extLst>
               </p14:cNvPr>
@@ -18436,7 +18494,7 @@
             </p14:xfrm>
           </p:contentPart>
         </mc:Choice>
-        <mc:Fallback>
+        <mc:Fallback xmlns="">
           <p:pic>
             <p:nvPicPr>
               <p:cNvPr id="36" name="Freihand 35">
@@ -18467,14 +18525,14 @@
           </p:pic>
         </mc:Fallback>
       </mc:AlternateContent>
-      <mc:AlternateContent xmlns:mc="http://schemas.openxmlformats.org/markup-compatibility/2006">
-        <mc:Choice xmlns:p14="http://schemas.microsoft.com/office/powerpoint/2010/main" Requires="p14">
+      <mc:AlternateContent xmlns:mc="http://schemas.openxmlformats.org/markup-compatibility/2006" xmlns:p14="http://schemas.microsoft.com/office/powerpoint/2010/main">
+        <mc:Choice Requires="p14">
           <p:contentPart p14:bwMode="auto" r:id="rId17">
             <p14:nvContentPartPr>
               <p14:cNvPr id="37" name="Freihand 36">
                 <a:extLst>
                   <a:ext uri="{FF2B5EF4-FFF2-40B4-BE49-F238E27FC236}">
-                    <a16:creationId xmlns:a16="http://schemas.microsoft.com/office/drawing/2014/main" id="{FDC75389-863D-B742-ADD7-B935EC321F07}"/>
+                    <a16:creationId xmlns="" xmlns:a16="http://schemas.microsoft.com/office/drawing/2014/main" id="{FDC75389-863D-B742-ADD7-B935EC321F07}"/>
                   </a:ext>
                 </a:extLst>
               </p14:cNvPr>
@@ -18487,7 +18545,7 @@
             </p14:xfrm>
           </p:contentPart>
         </mc:Choice>
-        <mc:Fallback>
+        <mc:Fallback xmlns="">
           <p:pic>
             <p:nvPicPr>
               <p:cNvPr id="37" name="Freihand 36">
@@ -18518,14 +18576,14 @@
           </p:pic>
         </mc:Fallback>
       </mc:AlternateContent>
-      <mc:AlternateContent xmlns:mc="http://schemas.openxmlformats.org/markup-compatibility/2006">
-        <mc:Choice xmlns:p14="http://schemas.microsoft.com/office/powerpoint/2010/main" Requires="p14">
+      <mc:AlternateContent xmlns:mc="http://schemas.openxmlformats.org/markup-compatibility/2006" xmlns:p14="http://schemas.microsoft.com/office/powerpoint/2010/main">
+        <mc:Choice Requires="p14">
           <p:contentPart p14:bwMode="auto" r:id="rId19">
             <p14:nvContentPartPr>
               <p14:cNvPr id="38" name="Freihand 37">
                 <a:extLst>
                   <a:ext uri="{FF2B5EF4-FFF2-40B4-BE49-F238E27FC236}">
-                    <a16:creationId xmlns:a16="http://schemas.microsoft.com/office/drawing/2014/main" id="{745650F8-7DA7-1240-9238-964CFE8A524F}"/>
+                    <a16:creationId xmlns="" xmlns:a16="http://schemas.microsoft.com/office/drawing/2014/main" id="{745650F8-7DA7-1240-9238-964CFE8A524F}"/>
                   </a:ext>
                 </a:extLst>
               </p14:cNvPr>
@@ -18538,7 +18596,7 @@
             </p14:xfrm>
           </p:contentPart>
         </mc:Choice>
-        <mc:Fallback>
+        <mc:Fallback xmlns="">
           <p:pic>
             <p:nvPicPr>
               <p:cNvPr id="38" name="Freihand 37">
@@ -18574,7 +18632,7 @@
           <p:cNvPr id="39" name="Grafik 38">
             <a:extLst>
               <a:ext uri="{FF2B5EF4-FFF2-40B4-BE49-F238E27FC236}">
-                <a16:creationId xmlns:a16="http://schemas.microsoft.com/office/drawing/2014/main" id="{146231C7-ACB6-1141-A8C0-780B2A8504FF}"/>
+                <a16:creationId xmlns="" xmlns:a16="http://schemas.microsoft.com/office/drawing/2014/main" id="{146231C7-ACB6-1141-A8C0-780B2A8504FF}"/>
               </a:ext>
             </a:extLst>
           </p:cNvPr>
@@ -18656,7 +18714,7 @@
           <p:cNvPr id="9" name="Gruppieren 8">
             <a:extLst>
               <a:ext uri="{FF2B5EF4-FFF2-40B4-BE49-F238E27FC236}">
-                <a16:creationId xmlns:a16="http://schemas.microsoft.com/office/drawing/2014/main" id="{783A73D2-C025-644E-A194-3438D291D352}"/>
+                <a16:creationId xmlns="" xmlns:a16="http://schemas.microsoft.com/office/drawing/2014/main" id="{783A73D2-C025-644E-A194-3438D291D352}"/>
               </a:ext>
             </a:extLst>
           </p:cNvPr>
@@ -18676,7 +18734,7 @@
             <p:cNvPr id="10" name="Rechteck 9">
               <a:extLst>
                 <a:ext uri="{FF2B5EF4-FFF2-40B4-BE49-F238E27FC236}">
-                  <a16:creationId xmlns:a16="http://schemas.microsoft.com/office/drawing/2014/main" id="{4F68B8E9-417E-0141-AE27-E298ED29929C}"/>
+                  <a16:creationId xmlns="" xmlns:a16="http://schemas.microsoft.com/office/drawing/2014/main" id="{4F68B8E9-417E-0141-AE27-E298ED29929C}"/>
                 </a:ext>
               </a:extLst>
             </p:cNvPr>
@@ -18811,7 +18869,7 @@
             <p:cNvPr id="11" name="Rechteck 10">
               <a:extLst>
                 <a:ext uri="{FF2B5EF4-FFF2-40B4-BE49-F238E27FC236}">
-                  <a16:creationId xmlns:a16="http://schemas.microsoft.com/office/drawing/2014/main" id="{B2717A64-B61E-B44C-B23D-CB509FB519CA}"/>
+                  <a16:creationId xmlns="" xmlns:a16="http://schemas.microsoft.com/office/drawing/2014/main" id="{B2717A64-B61E-B44C-B23D-CB509FB519CA}"/>
                 </a:ext>
               </a:extLst>
             </p:cNvPr>
@@ -18870,7 +18928,7 @@
           <p:cNvPr id="12" name="Gruppieren 11">
             <a:extLst>
               <a:ext uri="{FF2B5EF4-FFF2-40B4-BE49-F238E27FC236}">
-                <a16:creationId xmlns:a16="http://schemas.microsoft.com/office/drawing/2014/main" id="{783A73D2-C025-644E-A194-3438D291D352}"/>
+                <a16:creationId xmlns="" xmlns:a16="http://schemas.microsoft.com/office/drawing/2014/main" id="{783A73D2-C025-644E-A194-3438D291D352}"/>
               </a:ext>
             </a:extLst>
           </p:cNvPr>
@@ -18890,7 +18948,7 @@
             <p:cNvPr id="13" name="Rechteck 12">
               <a:extLst>
                 <a:ext uri="{FF2B5EF4-FFF2-40B4-BE49-F238E27FC236}">
-                  <a16:creationId xmlns:a16="http://schemas.microsoft.com/office/drawing/2014/main" id="{4F68B8E9-417E-0141-AE27-E298ED29929C}"/>
+                  <a16:creationId xmlns="" xmlns:a16="http://schemas.microsoft.com/office/drawing/2014/main" id="{4F68B8E9-417E-0141-AE27-E298ED29929C}"/>
                 </a:ext>
               </a:extLst>
             </p:cNvPr>
@@ -19033,7 +19091,7 @@
             <p:cNvPr id="14" name="Rechteck 13">
               <a:extLst>
                 <a:ext uri="{FF2B5EF4-FFF2-40B4-BE49-F238E27FC236}">
-                  <a16:creationId xmlns:a16="http://schemas.microsoft.com/office/drawing/2014/main" id="{B2717A64-B61E-B44C-B23D-CB509FB519CA}"/>
+                  <a16:creationId xmlns="" xmlns:a16="http://schemas.microsoft.com/office/drawing/2014/main" id="{B2717A64-B61E-B44C-B23D-CB509FB519CA}"/>
                 </a:ext>
               </a:extLst>
             </p:cNvPr>
@@ -19159,7 +19217,7 @@
             <p:cNvPr id="15" name="Rechteck 14">
               <a:extLst>
                 <a:ext uri="{FF2B5EF4-FFF2-40B4-BE49-F238E27FC236}">
-                  <a16:creationId xmlns:a16="http://schemas.microsoft.com/office/drawing/2014/main" id="{4F68B8E9-417E-0141-AE27-E298ED29929C}"/>
+                  <a16:creationId xmlns="" xmlns:a16="http://schemas.microsoft.com/office/drawing/2014/main" id="{4F68B8E9-417E-0141-AE27-E298ED29929C}"/>
                 </a:ext>
               </a:extLst>
             </p:cNvPr>
@@ -19304,7 +19362,7 @@
             <p:cNvPr id="17" name="Rechteck 16">
               <a:extLst>
                 <a:ext uri="{FF2B5EF4-FFF2-40B4-BE49-F238E27FC236}">
-                  <a16:creationId xmlns:a16="http://schemas.microsoft.com/office/drawing/2014/main" id="{4F68B8E9-417E-0141-AE27-E298ED29929C}"/>
+                  <a16:creationId xmlns="" xmlns:a16="http://schemas.microsoft.com/office/drawing/2014/main" id="{4F68B8E9-417E-0141-AE27-E298ED29929C}"/>
                 </a:ext>
               </a:extLst>
             </p:cNvPr>
@@ -19444,7 +19502,7 @@
             <p:cNvPr id="19" name="Rechteck 18">
               <a:extLst>
                 <a:ext uri="{FF2B5EF4-FFF2-40B4-BE49-F238E27FC236}">
-                  <a16:creationId xmlns:a16="http://schemas.microsoft.com/office/drawing/2014/main" id="{4F68B8E9-417E-0141-AE27-E298ED29929C}"/>
+                  <a16:creationId xmlns="" xmlns:a16="http://schemas.microsoft.com/office/drawing/2014/main" id="{4F68B8E9-417E-0141-AE27-E298ED29929C}"/>
                 </a:ext>
               </a:extLst>
             </p:cNvPr>
@@ -19569,7 +19627,7 @@
             <p:cNvPr id="24" name="Rechteck 23">
               <a:extLst>
                 <a:ext uri="{FF2B5EF4-FFF2-40B4-BE49-F238E27FC236}">
-                  <a16:creationId xmlns:a16="http://schemas.microsoft.com/office/drawing/2014/main" id="{4F68B8E9-417E-0141-AE27-E298ED29929C}"/>
+                  <a16:creationId xmlns="" xmlns:a16="http://schemas.microsoft.com/office/drawing/2014/main" id="{4F68B8E9-417E-0141-AE27-E298ED29929C}"/>
                 </a:ext>
               </a:extLst>
             </p:cNvPr>
@@ -19694,7 +19752,7 @@
             <p:cNvPr id="27" name="Rechteck 26">
               <a:extLst>
                 <a:ext uri="{FF2B5EF4-FFF2-40B4-BE49-F238E27FC236}">
-                  <a16:creationId xmlns:a16="http://schemas.microsoft.com/office/drawing/2014/main" id="{4F68B8E9-417E-0141-AE27-E298ED29929C}"/>
+                  <a16:creationId xmlns="" xmlns:a16="http://schemas.microsoft.com/office/drawing/2014/main" id="{4F68B8E9-417E-0141-AE27-E298ED29929C}"/>
                 </a:ext>
               </a:extLst>
             </p:cNvPr>
@@ -20004,7 +20062,7 @@
           <p:cNvPr id="44" name="Rechteck 43">
             <a:extLst>
               <a:ext uri="{FF2B5EF4-FFF2-40B4-BE49-F238E27FC236}">
-                <a16:creationId xmlns:a16="http://schemas.microsoft.com/office/drawing/2014/main" id="{4F68B8E9-417E-0141-AE27-E298ED29929C}"/>
+                <a16:creationId xmlns="" xmlns:a16="http://schemas.microsoft.com/office/drawing/2014/main" id="{4F68B8E9-417E-0141-AE27-E298ED29929C}"/>
               </a:ext>
             </a:extLst>
           </p:cNvPr>
@@ -20458,7 +20516,7 @@
           <p:cNvPr id="22" name="Rechteck 21">
             <a:extLst>
               <a:ext uri="{FF2B5EF4-FFF2-40B4-BE49-F238E27FC236}">
-                <a16:creationId xmlns:a16="http://schemas.microsoft.com/office/drawing/2014/main" id="{4F68B8E9-417E-0141-AE27-E298ED29929C}"/>
+                <a16:creationId xmlns="" xmlns:a16="http://schemas.microsoft.com/office/drawing/2014/main" id="{4F68B8E9-417E-0141-AE27-E298ED29929C}"/>
               </a:ext>
             </a:extLst>
           </p:cNvPr>
@@ -20538,7 +20596,7 @@
           <p:cNvPr id="23" name="Rechteck 22">
             <a:extLst>
               <a:ext uri="{FF2B5EF4-FFF2-40B4-BE49-F238E27FC236}">
-                <a16:creationId xmlns:a16="http://schemas.microsoft.com/office/drawing/2014/main" id="{4F68B8E9-417E-0141-AE27-E298ED29929C}"/>
+                <a16:creationId xmlns="" xmlns:a16="http://schemas.microsoft.com/office/drawing/2014/main" id="{4F68B8E9-417E-0141-AE27-E298ED29929C}"/>
               </a:ext>
             </a:extLst>
           </p:cNvPr>
@@ -20618,7 +20676,7 @@
           <p:cNvPr id="24" name="Rechteck 23">
             <a:extLst>
               <a:ext uri="{FF2B5EF4-FFF2-40B4-BE49-F238E27FC236}">
-                <a16:creationId xmlns:a16="http://schemas.microsoft.com/office/drawing/2014/main" id="{4F68B8E9-417E-0141-AE27-E298ED29929C}"/>
+                <a16:creationId xmlns="" xmlns:a16="http://schemas.microsoft.com/office/drawing/2014/main" id="{4F68B8E9-417E-0141-AE27-E298ED29929C}"/>
               </a:ext>
             </a:extLst>
           </p:cNvPr>
@@ -20698,7 +20756,7 @@
           <p:cNvPr id="9" name="Gruppieren 8">
             <a:extLst>
               <a:ext uri="{FF2B5EF4-FFF2-40B4-BE49-F238E27FC236}">
-                <a16:creationId xmlns:a16="http://schemas.microsoft.com/office/drawing/2014/main" id="{4486AD8C-AE56-D242-9D38-422C22DC0E79}"/>
+                <a16:creationId xmlns="" xmlns:a16="http://schemas.microsoft.com/office/drawing/2014/main" id="{4486AD8C-AE56-D242-9D38-422C22DC0E79}"/>
               </a:ext>
             </a:extLst>
           </p:cNvPr>
@@ -20718,7 +20776,7 @@
             <p:cNvPr id="10" name="Rechteck 9">
               <a:extLst>
                 <a:ext uri="{FF2B5EF4-FFF2-40B4-BE49-F238E27FC236}">
-                  <a16:creationId xmlns:a16="http://schemas.microsoft.com/office/drawing/2014/main" id="{2DA4F791-2771-0D4B-8E5A-B9FF3D3DFC09}"/>
+                  <a16:creationId xmlns="" xmlns:a16="http://schemas.microsoft.com/office/drawing/2014/main" id="{2DA4F791-2771-0D4B-8E5A-B9FF3D3DFC09}"/>
                 </a:ext>
               </a:extLst>
             </p:cNvPr>
@@ -20853,7 +20911,7 @@
             <p:cNvPr id="11" name="Rechteck 10">
               <a:extLst>
                 <a:ext uri="{FF2B5EF4-FFF2-40B4-BE49-F238E27FC236}">
-                  <a16:creationId xmlns:a16="http://schemas.microsoft.com/office/drawing/2014/main" id="{FFFFA022-777A-0A4E-911B-AEAE519D2060}"/>
+                  <a16:creationId xmlns="" xmlns:a16="http://schemas.microsoft.com/office/drawing/2014/main" id="{FFFFA022-777A-0A4E-911B-AEAE519D2060}"/>
                 </a:ext>
               </a:extLst>
             </p:cNvPr>
@@ -20912,7 +20970,7 @@
           <p:cNvPr id="12" name="Gruppieren 11">
             <a:extLst>
               <a:ext uri="{FF2B5EF4-FFF2-40B4-BE49-F238E27FC236}">
-                <a16:creationId xmlns:a16="http://schemas.microsoft.com/office/drawing/2014/main" id="{D9956327-EB0F-D642-9E9B-AC923698C656}"/>
+                <a16:creationId xmlns="" xmlns:a16="http://schemas.microsoft.com/office/drawing/2014/main" id="{D9956327-EB0F-D642-9E9B-AC923698C656}"/>
               </a:ext>
             </a:extLst>
           </p:cNvPr>
@@ -20932,7 +20990,7 @@
             <p:cNvPr id="13" name="Rechteck 12">
               <a:extLst>
                 <a:ext uri="{FF2B5EF4-FFF2-40B4-BE49-F238E27FC236}">
-                  <a16:creationId xmlns:a16="http://schemas.microsoft.com/office/drawing/2014/main" id="{F194248D-D9F9-4C4E-8A4C-40C1EA946B12}"/>
+                  <a16:creationId xmlns="" xmlns:a16="http://schemas.microsoft.com/office/drawing/2014/main" id="{F194248D-D9F9-4C4E-8A4C-40C1EA946B12}"/>
                 </a:ext>
               </a:extLst>
             </p:cNvPr>
@@ -21084,7 +21142,7 @@
             <p:cNvPr id="14" name="Rechteck 13">
               <a:extLst>
                 <a:ext uri="{FF2B5EF4-FFF2-40B4-BE49-F238E27FC236}">
-                  <a16:creationId xmlns:a16="http://schemas.microsoft.com/office/drawing/2014/main" id="{57653FD1-269E-D047-9260-0629BDF911AF}"/>
+                  <a16:creationId xmlns="" xmlns:a16="http://schemas.microsoft.com/office/drawing/2014/main" id="{57653FD1-269E-D047-9260-0629BDF911AF}"/>
                 </a:ext>
               </a:extLst>
             </p:cNvPr>
@@ -21278,7 +21336,7 @@
           <p:cNvPr id="4" name="Gruppieren 3">
             <a:extLst>
               <a:ext uri="{FF2B5EF4-FFF2-40B4-BE49-F238E27FC236}">
-                <a16:creationId xmlns:a16="http://schemas.microsoft.com/office/drawing/2014/main" id="{783A73D2-C025-644E-A194-3438D291D352}"/>
+                <a16:creationId xmlns="" xmlns:a16="http://schemas.microsoft.com/office/drawing/2014/main" id="{783A73D2-C025-644E-A194-3438D291D352}"/>
               </a:ext>
             </a:extLst>
           </p:cNvPr>
@@ -21298,7 +21356,7 @@
             <p:cNvPr id="5" name="Rechteck 4">
               <a:extLst>
                 <a:ext uri="{FF2B5EF4-FFF2-40B4-BE49-F238E27FC236}">
-                  <a16:creationId xmlns:a16="http://schemas.microsoft.com/office/drawing/2014/main" id="{4F68B8E9-417E-0141-AE27-E298ED29929C}"/>
+                  <a16:creationId xmlns="" xmlns:a16="http://schemas.microsoft.com/office/drawing/2014/main" id="{4F68B8E9-417E-0141-AE27-E298ED29929C}"/>
                 </a:ext>
               </a:extLst>
             </p:cNvPr>
@@ -21489,7 +21547,7 @@
             <p:cNvPr id="6" name="Rechteck 5">
               <a:extLst>
                 <a:ext uri="{FF2B5EF4-FFF2-40B4-BE49-F238E27FC236}">
-                  <a16:creationId xmlns:a16="http://schemas.microsoft.com/office/drawing/2014/main" id="{B2717A64-B61E-B44C-B23D-CB509FB519CA}"/>
+                  <a16:creationId xmlns="" xmlns:a16="http://schemas.microsoft.com/office/drawing/2014/main" id="{B2717A64-B61E-B44C-B23D-CB509FB519CA}"/>
                 </a:ext>
               </a:extLst>
             </p:cNvPr>
@@ -21548,7 +21606,7 @@
           <p:cNvPr id="7" name="Gruppieren 6">
             <a:extLst>
               <a:ext uri="{FF2B5EF4-FFF2-40B4-BE49-F238E27FC236}">
-                <a16:creationId xmlns:a16="http://schemas.microsoft.com/office/drawing/2014/main" id="{783A73D2-C025-644E-A194-3438D291D352}"/>
+                <a16:creationId xmlns="" xmlns:a16="http://schemas.microsoft.com/office/drawing/2014/main" id="{783A73D2-C025-644E-A194-3438D291D352}"/>
               </a:ext>
             </a:extLst>
           </p:cNvPr>
@@ -21568,7 +21626,7 @@
             <p:cNvPr id="8" name="Rechteck 7">
               <a:extLst>
                 <a:ext uri="{FF2B5EF4-FFF2-40B4-BE49-F238E27FC236}">
-                  <a16:creationId xmlns:a16="http://schemas.microsoft.com/office/drawing/2014/main" id="{4F68B8E9-417E-0141-AE27-E298ED29929C}"/>
+                  <a16:creationId xmlns="" xmlns:a16="http://schemas.microsoft.com/office/drawing/2014/main" id="{4F68B8E9-417E-0141-AE27-E298ED29929C}"/>
                 </a:ext>
               </a:extLst>
             </p:cNvPr>
@@ -21737,7 +21795,7 @@
             <p:cNvPr id="9" name="Rechteck 8">
               <a:extLst>
                 <a:ext uri="{FF2B5EF4-FFF2-40B4-BE49-F238E27FC236}">
-                  <a16:creationId xmlns:a16="http://schemas.microsoft.com/office/drawing/2014/main" id="{B2717A64-B61E-B44C-B23D-CB509FB519CA}"/>
+                  <a16:creationId xmlns="" xmlns:a16="http://schemas.microsoft.com/office/drawing/2014/main" id="{B2717A64-B61E-B44C-B23D-CB509FB519CA}"/>
                 </a:ext>
               </a:extLst>
             </p:cNvPr>
@@ -21872,21 +21930,21 @@
                 <a:gridCol w="2794176">
                   <a:extLst>
                     <a:ext uri="{9D8B030D-6E8A-4147-A177-3AD203B41FA5}">
-                      <a16:colId xmlns:a16="http://schemas.microsoft.com/office/drawing/2014/main" val="20000"/>
+                      <a16:colId xmlns="" xmlns:a16="http://schemas.microsoft.com/office/drawing/2014/main" val="20000"/>
                     </a:ext>
                   </a:extLst>
                 </a:gridCol>
                 <a:gridCol w="3736622">
                   <a:extLst>
                     <a:ext uri="{9D8B030D-6E8A-4147-A177-3AD203B41FA5}">
-                      <a16:colId xmlns:a16="http://schemas.microsoft.com/office/drawing/2014/main" val="20001"/>
+                      <a16:colId xmlns="" xmlns:a16="http://schemas.microsoft.com/office/drawing/2014/main" val="20001"/>
                     </a:ext>
                   </a:extLst>
                 </a:gridCol>
                 <a:gridCol w="4049890">
                   <a:extLst>
                     <a:ext uri="{9D8B030D-6E8A-4147-A177-3AD203B41FA5}">
-                      <a16:colId xmlns:a16="http://schemas.microsoft.com/office/drawing/2014/main" val="20002"/>
+                      <a16:colId xmlns="" xmlns:a16="http://schemas.microsoft.com/office/drawing/2014/main" val="20002"/>
                     </a:ext>
                   </a:extLst>
                 </a:gridCol>
@@ -22058,7 +22116,7 @@
                 </a:tc>
                 <a:extLst>
                   <a:ext uri="{0D108BD9-81ED-4DB2-BD59-A6C34878D82A}">
-                    <a16:rowId xmlns:a16="http://schemas.microsoft.com/office/drawing/2014/main" val="10000"/>
+                    <a16:rowId xmlns="" xmlns:a16="http://schemas.microsoft.com/office/drawing/2014/main" val="10000"/>
                   </a:ext>
                 </a:extLst>
               </a:tr>
@@ -22214,7 +22272,7 @@
                 </a:tc>
                 <a:extLst>
                   <a:ext uri="{0D108BD9-81ED-4DB2-BD59-A6C34878D82A}">
-                    <a16:rowId xmlns:a16="http://schemas.microsoft.com/office/drawing/2014/main" val="10001"/>
+                    <a16:rowId xmlns="" xmlns:a16="http://schemas.microsoft.com/office/drawing/2014/main" val="10001"/>
                   </a:ext>
                 </a:extLst>
               </a:tr>
@@ -22387,7 +22445,7 @@
                 </a:tc>
                 <a:extLst>
                   <a:ext uri="{0D108BD9-81ED-4DB2-BD59-A6C34878D82A}">
-                    <a16:rowId xmlns:a16="http://schemas.microsoft.com/office/drawing/2014/main" val="10002"/>
+                    <a16:rowId xmlns="" xmlns:a16="http://schemas.microsoft.com/office/drawing/2014/main" val="10002"/>
                   </a:ext>
                 </a:extLst>
               </a:tr>
@@ -22565,7 +22623,7 @@
                 </a:tc>
                 <a:extLst>
                   <a:ext uri="{0D108BD9-81ED-4DB2-BD59-A6C34878D82A}">
-                    <a16:rowId xmlns:a16="http://schemas.microsoft.com/office/drawing/2014/main" val="10003"/>
+                    <a16:rowId xmlns="" xmlns:a16="http://schemas.microsoft.com/office/drawing/2014/main" val="10003"/>
                   </a:ext>
                 </a:extLst>
               </a:tr>
@@ -22749,7 +22807,7 @@
                 </a:tc>
                 <a:extLst>
                   <a:ext uri="{0D108BD9-81ED-4DB2-BD59-A6C34878D82A}">
-                    <a16:rowId xmlns:a16="http://schemas.microsoft.com/office/drawing/2014/main" val="10004"/>
+                    <a16:rowId xmlns="" xmlns:a16="http://schemas.microsoft.com/office/drawing/2014/main" val="10004"/>
                   </a:ext>
                 </a:extLst>
               </a:tr>
@@ -22762,7 +22820,7 @@
           <p:cNvPr id="8" name="Grafik 7">
             <a:extLst>
               <a:ext uri="{FF2B5EF4-FFF2-40B4-BE49-F238E27FC236}">
-                <a16:creationId xmlns:a16="http://schemas.microsoft.com/office/drawing/2014/main" id="{A0D83B10-750B-6445-9B6E-0595A3D3107B}"/>
+                <a16:creationId xmlns="" xmlns:a16="http://schemas.microsoft.com/office/drawing/2014/main" id="{A0D83B10-750B-6445-9B6E-0595A3D3107B}"/>
               </a:ext>
             </a:extLst>
           </p:cNvPr>
@@ -22798,7 +22856,7 @@
           <p:cNvPr id="3" name="Rechteck 2">
             <a:extLst>
               <a:ext uri="{FF2B5EF4-FFF2-40B4-BE49-F238E27FC236}">
-                <a16:creationId xmlns:a16="http://schemas.microsoft.com/office/drawing/2014/main" id="{8931C094-1625-A446-B2FF-B51DE0FA36CB}"/>
+                <a16:creationId xmlns="" xmlns:a16="http://schemas.microsoft.com/office/drawing/2014/main" id="{8931C094-1625-A446-B2FF-B51DE0FA36CB}"/>
               </a:ext>
             </a:extLst>
           </p:cNvPr>

</xml_diff>